<commit_message>
update for delete foudnation model
</commit_message>
<xml_diff>
--- a/02Hardware/06Domestic/11AscendCompute.pptx
+++ b/02Hardware/06Domestic/11AscendCompute.pptx
@@ -11,10 +11,10 @@
     <p:sldMasterId id="2147483683" r:id="rId7"/>
   </p:sldMasterIdLst>
   <p:notesMasterIdLst>
-    <p:notesMasterId r:id="rId29"/>
+    <p:notesMasterId r:id="rId32"/>
   </p:notesMasterIdLst>
   <p:handoutMasterIdLst>
-    <p:handoutMasterId r:id="rId30"/>
+    <p:handoutMasterId r:id="rId33"/>
   </p:handoutMasterIdLst>
   <p:sldIdLst>
     <p:sldId id="2411" r:id="rId8"/>
@@ -25,19 +25,22 @@
     <p:sldId id="2457" r:id="rId13"/>
     <p:sldId id="2458" r:id="rId14"/>
     <p:sldId id="2455" r:id="rId15"/>
-    <p:sldId id="2445" r:id="rId16"/>
-    <p:sldId id="2451" r:id="rId17"/>
-    <p:sldId id="2450" r:id="rId18"/>
-    <p:sldId id="2449" r:id="rId19"/>
-    <p:sldId id="2453" r:id="rId20"/>
-    <p:sldId id="2448" r:id="rId21"/>
-    <p:sldId id="2452" r:id="rId22"/>
-    <p:sldId id="2413" r:id="rId23"/>
-    <p:sldId id="2396" r:id="rId24"/>
-    <p:sldId id="2415" r:id="rId25"/>
-    <p:sldId id="2412" r:id="rId26"/>
-    <p:sldId id="2392" r:id="rId27"/>
-    <p:sldId id="582" r:id="rId28"/>
+    <p:sldId id="2459" r:id="rId16"/>
+    <p:sldId id="2466" r:id="rId17"/>
+    <p:sldId id="2451" r:id="rId18"/>
+    <p:sldId id="2450" r:id="rId19"/>
+    <p:sldId id="2460" r:id="rId20"/>
+    <p:sldId id="2449" r:id="rId21"/>
+    <p:sldId id="2463" r:id="rId22"/>
+    <p:sldId id="2464" r:id="rId23"/>
+    <p:sldId id="2453" r:id="rId24"/>
+    <p:sldId id="2461" r:id="rId25"/>
+    <p:sldId id="2448" r:id="rId26"/>
+    <p:sldId id="2465" r:id="rId27"/>
+    <p:sldId id="2445" r:id="rId28"/>
+    <p:sldId id="2412" r:id="rId29"/>
+    <p:sldId id="2392" r:id="rId30"/>
+    <p:sldId id="582" r:id="rId31"/>
   </p:sldIdLst>
   <p:sldSz cx="12196763" cy="6858000"/>
   <p:notesSz cx="6858000" cy="9144000"/>
@@ -241,7 +244,7 @@
           <a:p>
             <a:fld id="{E8CF71B8-DF2A-2E41-BE66-2E18A767DA8A}" type="datetimeFigureOut">
               <a:rPr lang="en-US" smtClean="0"/>
-              <a:t>6/25/24</a:t>
+              <a:t>6/27/24</a:t>
             </a:fld>
             <a:endParaRPr lang="en-US"/>
           </a:p>
@@ -418,7 +421,7 @@
           <a:p>
             <a:fld id="{0DD60A27-BF12-6744-9E93-932A0E34D8BB}" type="datetimeFigureOut">
               <a:rPr lang="en-US" smtClean="0"/>
-              <a:t>6/25/24</a:t>
+              <a:t>6/27/24</a:t>
             </a:fld>
             <a:endParaRPr lang="en-US"/>
           </a:p>
@@ -9024,7 +9027,7 @@
                 </a:solidFill>
               </a:rPr>
               <a:pPr/>
-              <a:t>2024/6/25</a:t>
+              <a:t>2024/6/27</a:t>
             </a:fld>
             <a:endParaRPr lang="zh-CN" altLang="en-US" dirty="0">
               <a:solidFill>
@@ -24833,10 +24836,10 @@
       </p:grpSpPr>
       <p:sp>
         <p:nvSpPr>
-          <p:cNvPr id="8" name="标题 7">
+          <p:cNvPr id="3" name="内容占位符 2">
             <a:extLst>
               <a:ext uri="{FF2B5EF4-FFF2-40B4-BE49-F238E27FC236}">
-                <a16:creationId xmlns:a16="http://schemas.microsoft.com/office/drawing/2014/main" id="{DEFAD4EE-523B-6DD7-8237-298BDE55922F}"/>
+                <a16:creationId xmlns:a16="http://schemas.microsoft.com/office/drawing/2014/main" id="{86F38CED-23A2-F8C6-4739-20E1D5DE733A}"/>
               </a:ext>
             </a:extLst>
           </p:cNvPr>
@@ -24844,7 +24847,7 @@
             <a:spLocks noGrp="1"/>
           </p:cNvSpPr>
           <p:nvPr>
-            <p:ph type="title"/>
+            <p:ph sz="half" idx="1"/>
           </p:nvPr>
         </p:nvSpPr>
         <p:spPr/>
@@ -24852,49 +24855,38 @@
           <a:bodyPr/>
           <a:lstStyle/>
           <a:p>
-            <a:endParaRPr lang="zh-CN" altLang="en-US"/>
+            <a:r>
+              <a:rPr lang="en-US" altLang="zh-CN" dirty="0">
+                <a:latin typeface="Futura Medium" panose="020B0602020204020303" pitchFamily="34" charset="-79"/>
+                <a:cs typeface="Futura Medium" panose="020B0602020204020303" pitchFamily="34" charset="-79"/>
+              </a:rPr>
+              <a:t>Cube</a:t>
+            </a:r>
+            <a:r>
+              <a:rPr lang="zh-CN" altLang="en-US" dirty="0">
+                <a:latin typeface="Futura Medium" panose="020B0602020204020303" pitchFamily="34" charset="-79"/>
+                <a:cs typeface="Futura Medium" panose="020B0602020204020303" pitchFamily="34" charset="-79"/>
+              </a:rPr>
+              <a:t> </a:t>
+            </a:r>
+            <a:r>
+              <a:rPr lang="en-US" altLang="zh-CN" dirty="0">
+                <a:latin typeface="Futura Medium" panose="020B0602020204020303" pitchFamily="34" charset="-79"/>
+                <a:cs typeface="Futura Medium" panose="020B0602020204020303" pitchFamily="34" charset="-79"/>
+              </a:rPr>
+              <a:t>Core</a:t>
+            </a:r>
+            <a:endParaRPr lang="zh-CN" altLang="en-US" dirty="0">
+              <a:latin typeface="Futura Medium" panose="020B0602020204020303" pitchFamily="34" charset="-79"/>
+              <a:cs typeface="Futura Medium" panose="020B0602020204020303" pitchFamily="34" charset="-79"/>
+            </a:endParaRPr>
           </a:p>
         </p:txBody>
       </p:sp>
-      <p:pic>
-        <p:nvPicPr>
-          <p:cNvPr id="7" name="内容占位符 6">
-            <a:extLst>
-              <a:ext uri="{FF2B5EF4-FFF2-40B4-BE49-F238E27FC236}">
-                <a16:creationId xmlns:a16="http://schemas.microsoft.com/office/drawing/2014/main" id="{25B47879-9ECD-2ADC-CE54-265E9F48DFDE}"/>
-              </a:ext>
-            </a:extLst>
-          </p:cNvPr>
-          <p:cNvPicPr>
-            <a:picLocks noGrp="1" noChangeAspect="1"/>
-          </p:cNvPicPr>
-          <p:nvPr>
-            <p:ph sz="half" idx="1"/>
-          </p:nvPr>
-        </p:nvPicPr>
-        <p:blipFill>
-          <a:blip r:embed="rId2">
-            <a:extLst>
-              <a:ext uri="{28A0092B-C50C-407E-A947-70E740481C1C}">
-                <a14:useLocalDpi xmlns:a14="http://schemas.microsoft.com/office/drawing/2010/main" val="0"/>
-              </a:ext>
-            </a:extLst>
-          </a:blip>
-          <a:stretch>
-            <a:fillRect/>
-          </a:stretch>
-        </p:blipFill>
-        <p:spPr>
-          <a:xfrm>
-            <a:off x="623888" y="2488602"/>
-            <a:ext cx="10963275" cy="2738047"/>
-          </a:xfrm>
-        </p:spPr>
-      </p:pic>
     </p:spTree>
     <p:extLst>
       <p:ext uri="{BB962C8B-B14F-4D97-AF65-F5344CB8AC3E}">
-        <p14:creationId xmlns:p14="http://schemas.microsoft.com/office/powerpoint/2010/main" val="3217827718"/>
+        <p14:creationId xmlns:p14="http://schemas.microsoft.com/office/powerpoint/2010/main" val="515430582"/>
       </p:ext>
     </p:extLst>
   </p:cSld>
@@ -24938,7 +24930,7 @@
           <p:cNvPr id="8" name="标题 7">
             <a:extLst>
               <a:ext uri="{FF2B5EF4-FFF2-40B4-BE49-F238E27FC236}">
-                <a16:creationId xmlns:a16="http://schemas.microsoft.com/office/drawing/2014/main" id="{7576DAC4-4139-016A-2699-5431F44A45C6}"/>
+                <a16:creationId xmlns:a16="http://schemas.microsoft.com/office/drawing/2014/main" id="{DEFAD4EE-523B-6DD7-8237-298BDE55922F}"/>
               </a:ext>
             </a:extLst>
           </p:cNvPr>
@@ -24954,25 +24946,95 @@
           <a:bodyPr/>
           <a:lstStyle/>
           <a:p>
-            <a:endParaRPr lang="zh-CN" altLang="en-US"/>
+            <a:r>
+              <a:rPr lang="en-US" altLang="zh-CN" dirty="0"/>
+              <a:t>CPU</a:t>
+            </a:r>
+            <a:r>
+              <a:rPr lang="zh-CN" altLang="en-US" dirty="0"/>
+              <a:t> 矩阵乘法</a:t>
+            </a:r>
+          </a:p>
+        </p:txBody>
+      </p:sp>
+      <p:sp>
+        <p:nvSpPr>
+          <p:cNvPr id="3" name="内容占位符 2">
+            <a:extLst>
+              <a:ext uri="{FF2B5EF4-FFF2-40B4-BE49-F238E27FC236}">
+                <a16:creationId xmlns:a16="http://schemas.microsoft.com/office/drawing/2014/main" id="{18BD2441-0B0A-5AA2-62C1-F69FC05F98E7}"/>
+              </a:ext>
+            </a:extLst>
+          </p:cNvPr>
+          <p:cNvSpPr>
+            <a:spLocks noGrp="1"/>
+          </p:cNvSpPr>
+          <p:nvPr>
+            <p:ph sz="half" idx="1"/>
+          </p:nvPr>
+        </p:nvSpPr>
+        <p:spPr/>
+        <p:txBody>
+          <a:bodyPr/>
+          <a:lstStyle/>
+          <a:p>
+            <a:pPr algn="l"/>
+            <a:r>
+              <a:rPr lang="zh-CN" altLang="en-US" dirty="0"/>
+              <a:t>要用到 </a:t>
+            </a:r>
+            <a:r>
+              <a:rPr lang="en-US" altLang="zh-CN" dirty="0"/>
+              <a:t>3 </a:t>
+            </a:r>
+            <a:r>
+              <a:rPr lang="zh-CN" altLang="en-US" dirty="0"/>
+              <a:t>个循环进行一次完整矩阵相乘，在 </a:t>
+            </a:r>
+            <a:r>
+              <a:rPr lang="en-US" altLang="zh-CN" dirty="0"/>
+              <a:t>SISD</a:t>
+            </a:r>
+            <a:r>
+              <a:rPr lang="zh-CN" altLang="en-US" dirty="0"/>
+              <a:t> </a:t>
+            </a:r>
+            <a:r>
+              <a:rPr lang="en" altLang="zh-CN" dirty="0"/>
+              <a:t>CPU </a:t>
+            </a:r>
+            <a:r>
+              <a:rPr lang="zh-CN" altLang="en-US" dirty="0"/>
+              <a:t>上执行至少需要 </a:t>
+            </a:r>
+            <a:r>
+              <a:rPr lang="en" altLang="zh-CN" dirty="0"/>
+              <a:t>M*K*N </a:t>
+            </a:r>
+            <a:r>
+              <a:rPr lang="zh-CN" altLang="en-US" dirty="0"/>
+              <a:t>个指令周期才能完成，当矩阵非常庞大时执行过程极为耗时。</a:t>
+            </a:r>
+            <a:br>
+              <a:rPr lang="zh-CN" altLang="en-US" dirty="0"/>
+            </a:br>
+            <a:endParaRPr lang="zh-CN" altLang="en-US" dirty="0"/>
           </a:p>
         </p:txBody>
       </p:sp>
       <p:pic>
         <p:nvPicPr>
-          <p:cNvPr id="7" name="内容占位符 6">
+          <p:cNvPr id="4" name="内容占位符 6">
             <a:extLst>
               <a:ext uri="{FF2B5EF4-FFF2-40B4-BE49-F238E27FC236}">
-                <a16:creationId xmlns:a16="http://schemas.microsoft.com/office/drawing/2014/main" id="{8389BC74-D315-4368-6E4F-8FA0C211E7FF}"/>
+                <a16:creationId xmlns:a16="http://schemas.microsoft.com/office/drawing/2014/main" id="{A9CF75E6-6DB5-39E8-B866-FCEDB41987A8}"/>
               </a:ext>
             </a:extLst>
           </p:cNvPr>
           <p:cNvPicPr>
-            <a:picLocks noGrp="1" noChangeAspect="1"/>
+            <a:picLocks noChangeAspect="1"/>
           </p:cNvPicPr>
-          <p:nvPr>
-            <p:ph sz="half" idx="1"/>
-          </p:nvPr>
+          <p:nvPr/>
         </p:nvPicPr>
         <p:blipFill>
           <a:blip r:embed="rId2">
@@ -24988,15 +25050,19 @@
         </p:blipFill>
         <p:spPr>
           <a:xfrm>
-            <a:off x="1825625" y="2581275"/>
-            <a:ext cx="8559800" cy="2552700"/>
+            <a:off x="623833" y="2889294"/>
+            <a:ext cx="10963275" cy="2738047"/>
           </a:xfrm>
+          <a:prstGeom prst="rect">
+            <a:avLst/>
+          </a:prstGeom>
+          <a:noFill/>
         </p:spPr>
       </p:pic>
     </p:spTree>
     <p:extLst>
       <p:ext uri="{BB962C8B-B14F-4D97-AF65-F5344CB8AC3E}">
-        <p14:creationId xmlns:p14="http://schemas.microsoft.com/office/powerpoint/2010/main" val="3733394085"/>
+        <p14:creationId xmlns:p14="http://schemas.microsoft.com/office/powerpoint/2010/main" val="3217827718"/>
       </p:ext>
     </p:extLst>
   </p:cSld>
@@ -25040,7 +25106,7 @@
           <p:cNvPr id="8" name="标题 7">
             <a:extLst>
               <a:ext uri="{FF2B5EF4-FFF2-40B4-BE49-F238E27FC236}">
-                <a16:creationId xmlns:a16="http://schemas.microsoft.com/office/drawing/2014/main" id="{D93E0B32-D7F8-7DE9-3D66-20B57103D39B}"/>
+                <a16:creationId xmlns:a16="http://schemas.microsoft.com/office/drawing/2014/main" id="{7576DAC4-4139-016A-2699-5431F44A45C6}"/>
               </a:ext>
             </a:extLst>
           </p:cNvPr>
@@ -25056,25 +25122,113 @@
           <a:bodyPr/>
           <a:lstStyle/>
           <a:p>
-            <a:endParaRPr lang="zh-CN" altLang="en-US"/>
+            <a:r>
+              <a:rPr lang="en-US" altLang="zh-CN" dirty="0"/>
+              <a:t>CPU</a:t>
+            </a:r>
+            <a:r>
+              <a:rPr lang="zh-CN" altLang="en-US" dirty="0"/>
+              <a:t> 矩阵存储格式</a:t>
+            </a:r>
+          </a:p>
+        </p:txBody>
+      </p:sp>
+      <p:sp>
+        <p:nvSpPr>
+          <p:cNvPr id="9" name="内容占位符 8">
+            <a:extLst>
+              <a:ext uri="{FF2B5EF4-FFF2-40B4-BE49-F238E27FC236}">
+                <a16:creationId xmlns:a16="http://schemas.microsoft.com/office/drawing/2014/main" id="{6C401804-13F8-8293-9960-6625D1D0242B}"/>
+              </a:ext>
+            </a:extLst>
+          </p:cNvPr>
+          <p:cNvSpPr>
+            <a:spLocks noGrp="1"/>
+          </p:cNvSpPr>
+          <p:nvPr>
+            <p:ph sz="half" idx="1"/>
+          </p:nvPr>
+        </p:nvSpPr>
+        <p:spPr/>
+        <p:txBody>
+          <a:bodyPr/>
+          <a:lstStyle/>
+          <a:p>
+            <a:r>
+              <a:rPr lang="en" altLang="zh-CN" dirty="0"/>
+              <a:t>CPU </a:t>
+            </a:r>
+            <a:r>
+              <a:rPr lang="zh-CN" altLang="en-US" dirty="0"/>
+              <a:t>计算过程中，矩阵 </a:t>
+            </a:r>
+            <a:r>
+              <a:rPr lang="en" altLang="zh-CN" dirty="0"/>
+              <a:t>A </a:t>
+            </a:r>
+            <a:r>
+              <a:rPr lang="zh-CN" altLang="en-US" dirty="0"/>
+              <a:t>按照行扫描，矩阵 </a:t>
+            </a:r>
+            <a:r>
+              <a:rPr lang="en" altLang="zh-CN" dirty="0"/>
+              <a:t>B </a:t>
+            </a:r>
+            <a:r>
+              <a:rPr lang="zh-CN" altLang="en" dirty="0"/>
+              <a:t>按</a:t>
+            </a:r>
+            <a:r>
+              <a:rPr lang="zh-CN" altLang="en-US" dirty="0"/>
+              <a:t>列扫描；典型矩阵存储矩阵 </a:t>
+            </a:r>
+            <a:r>
+              <a:rPr lang="en" altLang="zh-CN" dirty="0"/>
+              <a:t>A </a:t>
+            </a:r>
+            <a:r>
+              <a:rPr lang="en-US" altLang="zh-CN" dirty="0"/>
+              <a:t>&amp;</a:t>
+            </a:r>
+            <a:r>
+              <a:rPr lang="zh-CN" altLang="en-US" dirty="0"/>
+              <a:t> 矩阵 </a:t>
+            </a:r>
+            <a:r>
+              <a:rPr lang="en" altLang="zh-CN" dirty="0"/>
+              <a:t>B </a:t>
+            </a:r>
+            <a:r>
+              <a:rPr lang="zh-CN" altLang="en-US" dirty="0"/>
+              <a:t>都按照行方式进行存放，即使 </a:t>
+            </a:r>
+            <a:r>
+              <a:rPr lang="en" altLang="zh-CN" dirty="0"/>
+              <a:t>Row-Major </a:t>
+            </a:r>
+            <a:r>
+              <a:rPr lang="zh-CN" altLang="en-US" dirty="0"/>
+              <a:t>方式。</a:t>
+            </a:r>
+          </a:p>
+          <a:p>
+            <a:endParaRPr lang="zh-CN" altLang="en-US" dirty="0"/>
           </a:p>
         </p:txBody>
       </p:sp>
       <p:pic>
         <p:nvPicPr>
-          <p:cNvPr id="7" name="内容占位符 6">
+          <p:cNvPr id="11" name="内容占位符 6">
             <a:extLst>
               <a:ext uri="{FF2B5EF4-FFF2-40B4-BE49-F238E27FC236}">
-                <a16:creationId xmlns:a16="http://schemas.microsoft.com/office/drawing/2014/main" id="{B66D95A8-C47B-01EF-B1AD-1BF967EC2FA4}"/>
+                <a16:creationId xmlns:a16="http://schemas.microsoft.com/office/drawing/2014/main" id="{5E0A9604-4174-13B3-3584-52EE811789C3}"/>
               </a:ext>
             </a:extLst>
           </p:cNvPr>
           <p:cNvPicPr>
-            <a:picLocks noGrp="1" noChangeAspect="1"/>
+            <a:picLocks noChangeAspect="1"/>
           </p:cNvPicPr>
-          <p:nvPr>
-            <p:ph sz="half" idx="1"/>
-          </p:nvPr>
+          <p:nvPr/>
         </p:nvPicPr>
         <p:blipFill>
           <a:blip r:embed="rId2">
@@ -25090,15 +25244,19 @@
         </p:blipFill>
         <p:spPr>
           <a:xfrm>
-            <a:off x="623888" y="2487216"/>
-            <a:ext cx="10963275" cy="2740818"/>
+            <a:off x="623833" y="2889294"/>
+            <a:ext cx="10963275" cy="2738047"/>
           </a:xfrm>
+          <a:prstGeom prst="rect">
+            <a:avLst/>
+          </a:prstGeom>
+          <a:noFill/>
         </p:spPr>
       </p:pic>
     </p:spTree>
     <p:extLst>
       <p:ext uri="{BB962C8B-B14F-4D97-AF65-F5344CB8AC3E}">
-        <p14:creationId xmlns:p14="http://schemas.microsoft.com/office/powerpoint/2010/main" val="1263774723"/>
+        <p14:creationId xmlns:p14="http://schemas.microsoft.com/office/powerpoint/2010/main" val="3733394085"/>
       </p:ext>
     </p:extLst>
   </p:cSld>
@@ -25139,10 +25297,10 @@
       </p:grpSpPr>
       <p:sp>
         <p:nvSpPr>
-          <p:cNvPr id="6" name="标题 5">
+          <p:cNvPr id="8" name="标题 7">
             <a:extLst>
               <a:ext uri="{FF2B5EF4-FFF2-40B4-BE49-F238E27FC236}">
-                <a16:creationId xmlns:a16="http://schemas.microsoft.com/office/drawing/2014/main" id="{FAAE688D-BB72-5F87-80BF-A9946FF17DC8}"/>
+                <a16:creationId xmlns:a16="http://schemas.microsoft.com/office/drawing/2014/main" id="{7576DAC4-4139-016A-2699-5431F44A45C6}"/>
               </a:ext>
             </a:extLst>
           </p:cNvPr>
@@ -25158,25 +25316,107 @@
           <a:bodyPr/>
           <a:lstStyle/>
           <a:p>
-            <a:endParaRPr lang="zh-CN" altLang="en-US"/>
+            <a:r>
+              <a:rPr lang="en-US" altLang="zh-CN" dirty="0"/>
+              <a:t>CPU</a:t>
+            </a:r>
+            <a:r>
+              <a:rPr lang="zh-CN" altLang="en-US" dirty="0"/>
+              <a:t> 矩阵存储格式</a:t>
+            </a:r>
+          </a:p>
+        </p:txBody>
+      </p:sp>
+      <p:sp>
+        <p:nvSpPr>
+          <p:cNvPr id="9" name="内容占位符 8">
+            <a:extLst>
+              <a:ext uri="{FF2B5EF4-FFF2-40B4-BE49-F238E27FC236}">
+                <a16:creationId xmlns:a16="http://schemas.microsoft.com/office/drawing/2014/main" id="{6C401804-13F8-8293-9960-6625D1D0242B}"/>
+              </a:ext>
+            </a:extLst>
+          </p:cNvPr>
+          <p:cNvSpPr>
+            <a:spLocks noGrp="1"/>
+          </p:cNvSpPr>
+          <p:nvPr>
+            <p:ph sz="half" idx="1"/>
+          </p:nvPr>
+        </p:nvSpPr>
+        <p:spPr/>
+        <p:txBody>
+          <a:bodyPr/>
+          <a:lstStyle/>
+          <a:p>
+            <a:r>
+              <a:rPr lang="zh-CN" altLang="en-US" dirty="0"/>
+              <a:t>内存读取按行读更方便，因此对 </a:t>
+            </a:r>
+            <a:r>
+              <a:rPr lang="en-US" altLang="zh-CN" dirty="0"/>
+              <a:t>A</a:t>
+            </a:r>
+            <a:r>
+              <a:rPr lang="zh-CN" altLang="en-US" dirty="0"/>
+              <a:t> 矩阵高效，</a:t>
+            </a:r>
+            <a:r>
+              <a:rPr lang="en-US" altLang="zh-CN" dirty="0"/>
+              <a:t>B</a:t>
+            </a:r>
+            <a:r>
+              <a:rPr lang="zh-CN" altLang="en-US" dirty="0"/>
+              <a:t> </a:t>
+            </a:r>
+            <a:r>
+              <a:rPr lang="en-US" altLang="zh-CN" dirty="0"/>
+              <a:t> </a:t>
+            </a:r>
+            <a:r>
+              <a:rPr lang="zh-CN" altLang="en-US" dirty="0"/>
+              <a:t>矩阵低效。为此需要将矩阵 </a:t>
+            </a:r>
+            <a:r>
+              <a:rPr lang="en" altLang="zh-CN" dirty="0"/>
+              <a:t>B </a:t>
+            </a:r>
+            <a:r>
+              <a:rPr lang="zh-CN" altLang="en-US" dirty="0"/>
+              <a:t>存储方式转成按列存储，即 </a:t>
+            </a:r>
+            <a:r>
+              <a:rPr lang="en" altLang="zh-CN" dirty="0"/>
+              <a:t>Column-Major</a:t>
+            </a:r>
+            <a:r>
+              <a:rPr lang="zh-CN" altLang="en-US" dirty="0"/>
+              <a:t> 矩阵计算，</a:t>
+            </a:r>
+            <a:r>
+              <a:rPr lang="en-US" altLang="zh-CN" dirty="0"/>
+              <a:t>NPU</a:t>
+            </a:r>
+            <a:r>
+              <a:rPr lang="zh-CN" altLang="en-US" dirty="0"/>
+              <a:t> 通过改变矩阵存储方式来提升矩阵计算的效率。</a:t>
+            </a:r>
+            <a:endParaRPr lang="en-US" altLang="zh-CN" dirty="0"/>
           </a:p>
         </p:txBody>
       </p:sp>
       <p:pic>
         <p:nvPicPr>
-          <p:cNvPr id="5" name="内容占位符 4">
+          <p:cNvPr id="10" name="内容占位符 6">
             <a:extLst>
               <a:ext uri="{FF2B5EF4-FFF2-40B4-BE49-F238E27FC236}">
-                <a16:creationId xmlns:a16="http://schemas.microsoft.com/office/drawing/2014/main" id="{FF1606DA-D24F-F100-9599-41DC9387A23D}"/>
+                <a16:creationId xmlns:a16="http://schemas.microsoft.com/office/drawing/2014/main" id="{7B39CF16-99FF-867F-A38F-C9C46E8667AF}"/>
               </a:ext>
             </a:extLst>
           </p:cNvPr>
           <p:cNvPicPr>
-            <a:picLocks noGrp="1" noChangeAspect="1"/>
+            <a:picLocks noChangeAspect="1"/>
           </p:cNvPicPr>
-          <p:nvPr>
-            <p:ph sz="half" idx="1"/>
-          </p:nvPr>
+          <p:nvPr/>
         </p:nvPicPr>
         <p:blipFill>
           <a:blip r:embed="rId2">
@@ -25192,15 +25432,19 @@
         </p:blipFill>
         <p:spPr>
           <a:xfrm>
-            <a:off x="1233605" y="1360488"/>
-            <a:ext cx="9743841" cy="4994275"/>
+            <a:off x="1825471" y="3100227"/>
+            <a:ext cx="8559800" cy="2552700"/>
           </a:xfrm>
+          <a:prstGeom prst="rect">
+            <a:avLst/>
+          </a:prstGeom>
+          <a:noFill/>
         </p:spPr>
       </p:pic>
     </p:spTree>
     <p:extLst>
       <p:ext uri="{BB962C8B-B14F-4D97-AF65-F5344CB8AC3E}">
-        <p14:creationId xmlns:p14="http://schemas.microsoft.com/office/powerpoint/2010/main" val="1857512827"/>
+        <p14:creationId xmlns:p14="http://schemas.microsoft.com/office/powerpoint/2010/main" val="1870201595"/>
       </p:ext>
     </p:extLst>
   </p:cSld>
@@ -25241,10 +25485,10 @@
       </p:grpSpPr>
       <p:sp>
         <p:nvSpPr>
-          <p:cNvPr id="8" name="标题 7">
+          <p:cNvPr id="3" name="标题 2">
             <a:extLst>
               <a:ext uri="{FF2B5EF4-FFF2-40B4-BE49-F238E27FC236}">
-                <a16:creationId xmlns:a16="http://schemas.microsoft.com/office/drawing/2014/main" id="{96B669DD-2F2A-094F-8006-91CB596C6616}"/>
+                <a16:creationId xmlns:a16="http://schemas.microsoft.com/office/drawing/2014/main" id="{023AB32B-9DCD-A49C-6580-6ED04B9F99C3}"/>
               </a:ext>
             </a:extLst>
           </p:cNvPr>
@@ -25260,25 +25504,108 @@
           <a:bodyPr/>
           <a:lstStyle/>
           <a:p>
-            <a:endParaRPr lang="zh-CN" altLang="en-US"/>
+            <a:r>
+              <a:rPr lang="zh-CN" altLang="en-US" dirty="0"/>
+              <a:t>矩阵分块 </a:t>
+            </a:r>
+            <a:r>
+              <a:rPr lang="en" altLang="zh-CN" dirty="0"/>
+              <a:t>Tiling</a:t>
+            </a:r>
+            <a:endParaRPr lang="zh-CN" altLang="en-US" dirty="0"/>
+          </a:p>
+        </p:txBody>
+      </p:sp>
+      <p:sp>
+        <p:nvSpPr>
+          <p:cNvPr id="5" name="内容占位符 4">
+            <a:extLst>
+              <a:ext uri="{FF2B5EF4-FFF2-40B4-BE49-F238E27FC236}">
+                <a16:creationId xmlns:a16="http://schemas.microsoft.com/office/drawing/2014/main" id="{51D4158C-6AD1-4699-C032-35AAE50318EF}"/>
+              </a:ext>
+            </a:extLst>
+          </p:cNvPr>
+          <p:cNvSpPr>
+            <a:spLocks noGrp="1"/>
+          </p:cNvSpPr>
+          <p:nvPr>
+            <p:ph sz="half" idx="1"/>
+          </p:nvPr>
+        </p:nvSpPr>
+        <p:spPr/>
+        <p:txBody>
+          <a:bodyPr/>
+          <a:lstStyle/>
+          <a:p>
+            <a:r>
+              <a:rPr lang="zh-CN" altLang="en-US" dirty="0"/>
+              <a:t>受限于片上缓存容量，一次难以装下整个矩阵 </a:t>
+            </a:r>
+            <a:r>
+              <a:rPr lang="en" altLang="zh-CN" dirty="0"/>
+              <a:t>B</a:t>
+            </a:r>
+            <a:r>
+              <a:rPr lang="zh-CN" altLang="en-US" dirty="0"/>
+              <a:t>，将 </a:t>
+            </a:r>
+            <a:r>
+              <a:rPr lang="en" altLang="zh-CN" dirty="0"/>
+              <a:t>B </a:t>
+            </a:r>
+            <a:r>
+              <a:rPr lang="zh-CN" altLang="en-US" dirty="0"/>
+              <a:t>划分成为 </a:t>
+            </a:r>
+            <a:r>
+              <a:rPr lang="en" altLang="zh-CN" dirty="0"/>
+              <a:t>B0</a:t>
+            </a:r>
+            <a:r>
+              <a:rPr lang="zh-CN" altLang="en" dirty="0"/>
+              <a:t>、</a:t>
+            </a:r>
+            <a:r>
+              <a:rPr lang="en" altLang="zh-CN" dirty="0"/>
+              <a:t>B1</a:t>
+            </a:r>
+            <a:r>
+              <a:rPr lang="en-US" altLang="zh-CN" dirty="0"/>
+              <a:t>…</a:t>
+            </a:r>
+            <a:r>
+              <a:rPr lang="en" altLang="zh-CN" dirty="0"/>
+              <a:t> </a:t>
+            </a:r>
+            <a:r>
+              <a:rPr lang="zh-CN" altLang="en-US" dirty="0"/>
+              <a:t>等多个子矩阵；如此往复，依次将所有子矩阵搬运到缓存中，完成计算全过程，得到结果矩阵 </a:t>
+            </a:r>
+            <a:r>
+              <a:rPr lang="en" altLang="zh-CN" dirty="0"/>
+              <a:t>C</a:t>
+            </a:r>
+            <a:r>
+              <a:rPr lang="zh-CN" altLang="en" dirty="0"/>
+              <a:t>。</a:t>
+            </a:r>
+            <a:endParaRPr lang="zh-CN" altLang="en-US" dirty="0"/>
           </a:p>
         </p:txBody>
       </p:sp>
       <p:pic>
         <p:nvPicPr>
-          <p:cNvPr id="7" name="内容占位符 6">
+          <p:cNvPr id="6" name="内容占位符 6">
             <a:extLst>
               <a:ext uri="{FF2B5EF4-FFF2-40B4-BE49-F238E27FC236}">
-                <a16:creationId xmlns:a16="http://schemas.microsoft.com/office/drawing/2014/main" id="{A46C8374-B5F5-AB90-B976-13937BC038FE}"/>
+                <a16:creationId xmlns:a16="http://schemas.microsoft.com/office/drawing/2014/main" id="{17031A2D-F1DA-87F2-8D3D-BDAB834292CE}"/>
               </a:ext>
             </a:extLst>
           </p:cNvPr>
           <p:cNvPicPr>
-            <a:picLocks noGrp="1" noChangeAspect="1"/>
+            <a:picLocks noChangeAspect="1"/>
           </p:cNvPicPr>
-          <p:nvPr>
-            <p:ph sz="half" idx="1"/>
-          </p:nvPr>
+          <p:nvPr/>
         </p:nvPicPr>
         <p:blipFill>
           <a:blip r:embed="rId2">
@@ -25294,15 +25621,19 @@
         </p:blipFill>
         <p:spPr>
           <a:xfrm>
-            <a:off x="1893035" y="1360488"/>
-            <a:ext cx="8424980" cy="4994275"/>
+            <a:off x="616743" y="2929005"/>
+            <a:ext cx="10963275" cy="2740818"/>
           </a:xfrm>
+          <a:prstGeom prst="rect">
+            <a:avLst/>
+          </a:prstGeom>
+          <a:noFill/>
         </p:spPr>
       </p:pic>
     </p:spTree>
     <p:extLst>
       <p:ext uri="{BB962C8B-B14F-4D97-AF65-F5344CB8AC3E}">
-        <p14:creationId xmlns:p14="http://schemas.microsoft.com/office/powerpoint/2010/main" val="4029986628"/>
+        <p14:creationId xmlns:p14="http://schemas.microsoft.com/office/powerpoint/2010/main" val="1263774723"/>
       </p:ext>
     </p:extLst>
   </p:cSld>
@@ -25343,10 +25674,10 @@
       </p:grpSpPr>
       <p:sp>
         <p:nvSpPr>
-          <p:cNvPr id="6" name="标题 5">
+          <p:cNvPr id="3" name="标题 2">
             <a:extLst>
               <a:ext uri="{FF2B5EF4-FFF2-40B4-BE49-F238E27FC236}">
-                <a16:creationId xmlns:a16="http://schemas.microsoft.com/office/drawing/2014/main" id="{CFB86431-8C4D-65EF-C88A-946C04D28BE1}"/>
+                <a16:creationId xmlns:a16="http://schemas.microsoft.com/office/drawing/2014/main" id="{023AB32B-9DCD-A49C-6580-6ED04B9F99C3}"/>
               </a:ext>
             </a:extLst>
           </p:cNvPr>
@@ -25362,25 +25693,108 @@
           <a:bodyPr/>
           <a:lstStyle/>
           <a:p>
-            <a:endParaRPr lang="zh-CN" altLang="en-US"/>
+            <a:r>
+              <a:rPr lang="zh-CN" altLang="en-US" dirty="0"/>
+              <a:t>矩阵分块 </a:t>
+            </a:r>
+            <a:r>
+              <a:rPr lang="en" altLang="zh-CN" dirty="0"/>
+              <a:t>Tiling</a:t>
+            </a:r>
+            <a:endParaRPr lang="zh-CN" altLang="en-US" dirty="0"/>
+          </a:p>
+        </p:txBody>
+      </p:sp>
+      <p:sp>
+        <p:nvSpPr>
+          <p:cNvPr id="5" name="内容占位符 4">
+            <a:extLst>
+              <a:ext uri="{FF2B5EF4-FFF2-40B4-BE49-F238E27FC236}">
+                <a16:creationId xmlns:a16="http://schemas.microsoft.com/office/drawing/2014/main" id="{51D4158C-6AD1-4699-C032-35AAE50318EF}"/>
+              </a:ext>
+            </a:extLst>
+          </p:cNvPr>
+          <p:cNvSpPr>
+            <a:spLocks noGrp="1"/>
+          </p:cNvSpPr>
+          <p:nvPr>
+            <p:ph sz="half" idx="1"/>
+          </p:nvPr>
+        </p:nvSpPr>
+        <p:spPr/>
+        <p:txBody>
+          <a:bodyPr/>
+          <a:lstStyle/>
+          <a:p>
+            <a:r>
+              <a:rPr lang="zh-CN" altLang="en-US" dirty="0"/>
+              <a:t>受限于片上缓存容量，一次难以装下整个矩阵 </a:t>
+            </a:r>
+            <a:r>
+              <a:rPr lang="en" altLang="zh-CN" dirty="0"/>
+              <a:t>B</a:t>
+            </a:r>
+            <a:r>
+              <a:rPr lang="zh-CN" altLang="en-US" dirty="0"/>
+              <a:t>，将 </a:t>
+            </a:r>
+            <a:r>
+              <a:rPr lang="en" altLang="zh-CN" dirty="0"/>
+              <a:t>B </a:t>
+            </a:r>
+            <a:r>
+              <a:rPr lang="zh-CN" altLang="en-US" dirty="0"/>
+              <a:t>划分成为 </a:t>
+            </a:r>
+            <a:r>
+              <a:rPr lang="en" altLang="zh-CN" dirty="0"/>
+              <a:t>B0</a:t>
+            </a:r>
+            <a:r>
+              <a:rPr lang="zh-CN" altLang="en" dirty="0"/>
+              <a:t>、</a:t>
+            </a:r>
+            <a:r>
+              <a:rPr lang="en" altLang="zh-CN" dirty="0"/>
+              <a:t>B1</a:t>
+            </a:r>
+            <a:r>
+              <a:rPr lang="en-US" altLang="zh-CN" dirty="0"/>
+              <a:t>…</a:t>
+            </a:r>
+            <a:r>
+              <a:rPr lang="en" altLang="zh-CN" dirty="0"/>
+              <a:t> </a:t>
+            </a:r>
+            <a:r>
+              <a:rPr lang="zh-CN" altLang="en-US" dirty="0"/>
+              <a:t>等多个子矩阵；如此往复，依次将所有子矩阵搬运到缓存中，完成计算全过程，得到结果矩阵 </a:t>
+            </a:r>
+            <a:r>
+              <a:rPr lang="en" altLang="zh-CN" dirty="0"/>
+              <a:t>C</a:t>
+            </a:r>
+            <a:r>
+              <a:rPr lang="zh-CN" altLang="en" dirty="0"/>
+              <a:t>。</a:t>
+            </a:r>
+            <a:endParaRPr lang="zh-CN" altLang="en-US" dirty="0"/>
           </a:p>
         </p:txBody>
       </p:sp>
       <p:pic>
         <p:nvPicPr>
-          <p:cNvPr id="5" name="内容占位符 4">
+          <p:cNvPr id="2" name="内容占位符 4">
             <a:extLst>
               <a:ext uri="{FF2B5EF4-FFF2-40B4-BE49-F238E27FC236}">
-                <a16:creationId xmlns:a16="http://schemas.microsoft.com/office/drawing/2014/main" id="{94C0FA5A-D977-D17B-3D2C-8A2C75A42BD2}"/>
+                <a16:creationId xmlns:a16="http://schemas.microsoft.com/office/drawing/2014/main" id="{78DD7360-D7EA-E493-5FEA-FD61F76068E3}"/>
               </a:ext>
             </a:extLst>
           </p:cNvPr>
           <p:cNvPicPr>
-            <a:picLocks noGrp="1" noChangeAspect="1"/>
+            <a:picLocks noChangeAspect="1"/>
           </p:cNvPicPr>
-          <p:nvPr>
-            <p:ph sz="half" idx="1"/>
-          </p:nvPr>
+          <p:nvPr/>
         </p:nvPicPr>
         <p:blipFill>
           <a:blip r:embed="rId2">
@@ -25396,15 +25810,19 @@
         </p:blipFill>
         <p:spPr>
           <a:xfrm>
-            <a:off x="623888" y="1814969"/>
-            <a:ext cx="10963275" cy="4085313"/>
+            <a:off x="823671" y="2477334"/>
+            <a:ext cx="9871324" cy="3678413"/>
           </a:xfrm>
+          <a:prstGeom prst="rect">
+            <a:avLst/>
+          </a:prstGeom>
+          <a:noFill/>
         </p:spPr>
       </p:pic>
     </p:spTree>
     <p:extLst>
       <p:ext uri="{BB962C8B-B14F-4D97-AF65-F5344CB8AC3E}">
-        <p14:creationId xmlns:p14="http://schemas.microsoft.com/office/powerpoint/2010/main" val="795469997"/>
+        <p14:creationId xmlns:p14="http://schemas.microsoft.com/office/powerpoint/2010/main" val="2808765762"/>
       </p:ext>
     </p:extLst>
   </p:cSld>
@@ -25445,10 +25863,43 @@
       </p:grpSpPr>
       <p:sp>
         <p:nvSpPr>
-          <p:cNvPr id="2" name="内容占位符 1">
+          <p:cNvPr id="3" name="标题 2">
             <a:extLst>
               <a:ext uri="{FF2B5EF4-FFF2-40B4-BE49-F238E27FC236}">
-                <a16:creationId xmlns:a16="http://schemas.microsoft.com/office/drawing/2014/main" id="{9A886A44-E4B7-BAD6-B0F6-B2C995C4750A}"/>
+                <a16:creationId xmlns:a16="http://schemas.microsoft.com/office/drawing/2014/main" id="{023AB32B-9DCD-A49C-6580-6ED04B9F99C3}"/>
+              </a:ext>
+            </a:extLst>
+          </p:cNvPr>
+          <p:cNvSpPr>
+            <a:spLocks noGrp="1"/>
+          </p:cNvSpPr>
+          <p:nvPr>
+            <p:ph type="title"/>
+          </p:nvPr>
+        </p:nvSpPr>
+        <p:spPr/>
+        <p:txBody>
+          <a:bodyPr/>
+          <a:lstStyle/>
+          <a:p>
+            <a:r>
+              <a:rPr lang="zh-CN" altLang="en-US" dirty="0"/>
+              <a:t>矩阵分块 </a:t>
+            </a:r>
+            <a:r>
+              <a:rPr lang="en" altLang="zh-CN" dirty="0"/>
+              <a:t>Tiling</a:t>
+            </a:r>
+            <a:endParaRPr lang="zh-CN" altLang="en-US" dirty="0"/>
+          </a:p>
+        </p:txBody>
+      </p:sp>
+      <p:sp>
+        <p:nvSpPr>
+          <p:cNvPr id="5" name="内容占位符 4">
+            <a:extLst>
+              <a:ext uri="{FF2B5EF4-FFF2-40B4-BE49-F238E27FC236}">
+                <a16:creationId xmlns:a16="http://schemas.microsoft.com/office/drawing/2014/main" id="{51D4158C-6AD1-4699-C032-35AAE50318EF}"/>
               </a:ext>
             </a:extLst>
           </p:cNvPr>
@@ -25459,43 +25910,555 @@
             <p:ph sz="half" idx="1"/>
           </p:nvPr>
         </p:nvSpPr>
-        <p:spPr/>
+        <p:spPr>
+          <a:xfrm>
+            <a:off x="1260633" y="1791685"/>
+            <a:ext cx="2766837" cy="589190"/>
+          </a:xfrm>
+        </p:spPr>
         <p:txBody>
-          <a:bodyPr>
-            <a:normAutofit/>
-          </a:bodyPr>
+          <a:bodyPr/>
           <a:lstStyle/>
           <a:p>
-            <a:r>
-              <a:rPr kumimoji="1" lang="zh-CN" altLang="en-US" dirty="0"/>
-              <a:t>芯片 </a:t>
-            </a:r>
-            <a:r>
-              <a:rPr kumimoji="1" lang="en-US" altLang="zh-CN" dirty="0"/>
-              <a:t>&amp;</a:t>
-            </a:r>
-            <a:r>
-              <a:rPr kumimoji="1" lang="zh-CN" altLang="en-US" dirty="0"/>
+            <a:pPr marL="0" indent="0" algn="ctr">
+              <a:buNone/>
+            </a:pPr>
+            <a:r>
+              <a:rPr lang="zh-CN" altLang="en-US" dirty="0"/>
+              <a:t>大 </a:t>
+            </a:r>
+            <a:r>
+              <a:rPr lang="en" altLang="zh-CN" dirty="0"/>
+              <a:t>Z</a:t>
+            </a:r>
+            <a:r>
+              <a:rPr lang="zh-CN" altLang="en-US" dirty="0"/>
+              <a:t> 小 </a:t>
+            </a:r>
+            <a:r>
+              <a:rPr lang="en" altLang="zh-CN" dirty="0"/>
+              <a:t>z</a:t>
+            </a:r>
+            <a:r>
+              <a:rPr lang="zh-CN" altLang="en-US" dirty="0"/>
               <a:t> </a:t>
             </a:r>
-            <a:endParaRPr kumimoji="1" lang="en-US" altLang="zh-CN" dirty="0"/>
           </a:p>
+        </p:txBody>
+      </p:sp>
+      <p:pic>
+        <p:nvPicPr>
+          <p:cNvPr id="2" name="内容占位符 4">
+            <a:extLst>
+              <a:ext uri="{FF2B5EF4-FFF2-40B4-BE49-F238E27FC236}">
+                <a16:creationId xmlns:a16="http://schemas.microsoft.com/office/drawing/2014/main" id="{78DD7360-D7EA-E493-5FEA-FD61F76068E3}"/>
+              </a:ext>
+            </a:extLst>
+          </p:cNvPr>
+          <p:cNvPicPr>
+            <a:picLocks noChangeAspect="1"/>
+          </p:cNvPicPr>
+          <p:nvPr/>
+        </p:nvPicPr>
+        <p:blipFill>
+          <a:blip r:embed="rId2">
+            <a:extLst>
+              <a:ext uri="{28A0092B-C50C-407E-A947-70E740481C1C}">
+                <a14:useLocalDpi xmlns:a14="http://schemas.microsoft.com/office/drawing/2010/main" val="0"/>
+              </a:ext>
+            </a:extLst>
+          </a:blip>
+          <a:stretch>
+            <a:fillRect/>
+          </a:stretch>
+        </p:blipFill>
+        <p:spPr>
+          <a:xfrm>
+            <a:off x="823671" y="2477334"/>
+            <a:ext cx="9871324" cy="3678413"/>
+          </a:xfrm>
+          <a:prstGeom prst="rect">
+            <a:avLst/>
+          </a:prstGeom>
+          <a:noFill/>
+        </p:spPr>
+      </p:pic>
+      <p:sp>
+        <p:nvSpPr>
+          <p:cNvPr id="4" name="内容占位符 4">
+            <a:extLst>
+              <a:ext uri="{FF2B5EF4-FFF2-40B4-BE49-F238E27FC236}">
+                <a16:creationId xmlns:a16="http://schemas.microsoft.com/office/drawing/2014/main" id="{5CF734B1-4EB5-8268-98FE-71A37105DCFD}"/>
+              </a:ext>
+            </a:extLst>
+          </p:cNvPr>
+          <p:cNvSpPr txBox="1">
+            <a:spLocks/>
+          </p:cNvSpPr>
+          <p:nvPr/>
+        </p:nvSpPr>
+        <p:spPr>
+          <a:xfrm>
+            <a:off x="4620080" y="1799230"/>
+            <a:ext cx="2766837" cy="589190"/>
+          </a:xfrm>
+          <a:prstGeom prst="rect">
+            <a:avLst/>
+          </a:prstGeom>
+          <a:noFill/>
+        </p:spPr>
+        <p:txBody>
+          <a:bodyPr/>
+          <a:lstStyle>
+            <a:lvl1pPr marL="239106" marR="0" indent="-239106" algn="l" defTabSz="1218804" rtl="0" eaLnBrk="1" fontAlgn="base" latinLnBrk="1" hangingPunct="1">
+              <a:lnSpc>
+                <a:spcPct val="150000"/>
+              </a:lnSpc>
+              <a:spcBef>
+                <a:spcPts val="0"/>
+              </a:spcBef>
+              <a:spcAft>
+                <a:spcPts val="800"/>
+              </a:spcAft>
+              <a:buClr>
+                <a:srgbClr val="92D050"/>
+              </a:buClr>
+              <a:buFont typeface="Arial" pitchFamily="34" charset="0"/>
+              <a:buChar char="•"/>
+              <a:tabLst/>
+              <a:defRPr kumimoji="0" lang="zh-CN" altLang="en-US" sz="2000" b="0" i="0" u="none" strike="noStrike" kern="0" cap="none" spc="0" normalizeH="0" baseline="0" dirty="0">
+                <a:ln>
+                  <a:noFill/>
+                </a:ln>
+                <a:solidFill>
+                  <a:srgbClr val="374154"/>
+                </a:solidFill>
+                <a:effectLst/>
+                <a:uLnTx/>
+                <a:uFillTx/>
+                <a:latin typeface="Gill Sans MT" panose="020B0502020104020203" pitchFamily="34" charset="0"/>
+                <a:ea typeface="微软雅黑" pitchFamily="34" charset="-122"/>
+                <a:cs typeface="+mn-cs"/>
+              </a:defRPr>
+            </a:lvl1pPr>
+            <a:lvl2pPr marL="476096" marR="0" indent="-236990" algn="l" defTabSz="1218804" rtl="0" eaLnBrk="1" fontAlgn="base" latinLnBrk="1" hangingPunct="1">
+              <a:lnSpc>
+                <a:spcPct val="150000"/>
+              </a:lnSpc>
+              <a:spcBef>
+                <a:spcPts val="0"/>
+              </a:spcBef>
+              <a:spcAft>
+                <a:spcPts val="800"/>
+              </a:spcAft>
+              <a:buClr>
+                <a:srgbClr val="92D050"/>
+              </a:buClr>
+              <a:buFont typeface="Arial" panose="020B0604020202020204" pitchFamily="34" charset="0"/>
+              <a:buChar char="◦"/>
+              <a:tabLst/>
+              <a:defRPr kumimoji="0" lang="zh-CN" altLang="en-US" sz="1800" b="0" i="0" u="none" strike="noStrike" kern="0" cap="none" spc="0" normalizeH="0" baseline="0" dirty="0">
+                <a:ln>
+                  <a:noFill/>
+                </a:ln>
+                <a:solidFill>
+                  <a:srgbClr val="374154"/>
+                </a:solidFill>
+                <a:effectLst/>
+                <a:uLnTx/>
+                <a:uFillTx/>
+                <a:latin typeface="Gill Sans MT" panose="020B0502020104020203" pitchFamily="34" charset="0"/>
+                <a:ea typeface="微软雅黑" pitchFamily="34" charset="-122"/>
+                <a:cs typeface="+mn-cs"/>
+              </a:defRPr>
+            </a:lvl2pPr>
+            <a:lvl3pPr marL="833696" marR="0" indent="-236990" algn="l" defTabSz="1218804" rtl="0" eaLnBrk="1" fontAlgn="base" latinLnBrk="1" hangingPunct="1">
+              <a:lnSpc>
+                <a:spcPct val="150000"/>
+              </a:lnSpc>
+              <a:spcBef>
+                <a:spcPts val="0"/>
+              </a:spcBef>
+              <a:spcAft>
+                <a:spcPts val="800"/>
+              </a:spcAft>
+              <a:buClr>
+                <a:srgbClr val="92D050"/>
+              </a:buClr>
+              <a:buFontTx/>
+              <a:buChar char="-"/>
+              <a:tabLst/>
+              <a:defRPr kumimoji="0" lang="zh-CN" altLang="en-US" sz="1600" b="0" i="0" u="none" strike="noStrike" kern="0" cap="none" spc="0" normalizeH="0" baseline="0" dirty="0">
+                <a:ln>
+                  <a:noFill/>
+                </a:ln>
+                <a:solidFill>
+                  <a:srgbClr val="374154"/>
+                </a:solidFill>
+                <a:effectLst/>
+                <a:uLnTx/>
+                <a:uFillTx/>
+                <a:latin typeface="Gill Sans MT" panose="020B0502020104020203" pitchFamily="34" charset="0"/>
+                <a:ea typeface="微软雅黑" pitchFamily="34" charset="-122"/>
+                <a:cs typeface="+mn-cs"/>
+              </a:defRPr>
+            </a:lvl3pPr>
+            <a:lvl4pPr marL="2133600" indent="-304800" algn="l" defTabSz="1219200" rtl="0" eaLnBrk="1" latinLnBrk="0" hangingPunct="1">
+              <a:spcBef>
+                <a:spcPct val="20000"/>
+              </a:spcBef>
+              <a:buFont typeface="Arial" pitchFamily="34" charset="0"/>
+              <a:buChar char="–"/>
+              <a:defRPr sz="1542" kern="1200">
+                <a:solidFill>
+                  <a:schemeClr val="tx1"/>
+                </a:solidFill>
+                <a:latin typeface="+mn-lt"/>
+                <a:ea typeface="+mn-ea"/>
+                <a:cs typeface="+mn-cs"/>
+              </a:defRPr>
+            </a:lvl4pPr>
+            <a:lvl5pPr marL="2743200" indent="-304800" algn="l" defTabSz="1219200" rtl="0" eaLnBrk="1" latinLnBrk="0" hangingPunct="1">
+              <a:spcBef>
+                <a:spcPct val="20000"/>
+              </a:spcBef>
+              <a:buFont typeface="Arial" pitchFamily="34" charset="0"/>
+              <a:buChar char="»"/>
+              <a:defRPr sz="1542" kern="1200">
+                <a:solidFill>
+                  <a:schemeClr val="tx1"/>
+                </a:solidFill>
+                <a:latin typeface="+mn-lt"/>
+                <a:ea typeface="+mn-ea"/>
+                <a:cs typeface="+mn-cs"/>
+              </a:defRPr>
+            </a:lvl5pPr>
+            <a:lvl6pPr marL="3352800" indent="-304800" algn="l" defTabSz="1219200" rtl="0" eaLnBrk="1" latinLnBrk="0" hangingPunct="1">
+              <a:spcBef>
+                <a:spcPct val="20000"/>
+              </a:spcBef>
+              <a:buFont typeface="Arial" pitchFamily="34" charset="0"/>
+              <a:buChar char="•"/>
+              <a:defRPr sz="1542" kern="1200">
+                <a:solidFill>
+                  <a:schemeClr val="tx1"/>
+                </a:solidFill>
+                <a:latin typeface="+mn-lt"/>
+                <a:ea typeface="+mn-ea"/>
+                <a:cs typeface="+mn-cs"/>
+              </a:defRPr>
+            </a:lvl6pPr>
+            <a:lvl7pPr marL="3962399" indent="-304800" algn="l" defTabSz="1219200" rtl="0" eaLnBrk="1" latinLnBrk="0" hangingPunct="1">
+              <a:spcBef>
+                <a:spcPct val="20000"/>
+              </a:spcBef>
+              <a:buFont typeface="Arial" pitchFamily="34" charset="0"/>
+              <a:buChar char="•"/>
+              <a:defRPr sz="1542" kern="1200">
+                <a:solidFill>
+                  <a:schemeClr val="tx1"/>
+                </a:solidFill>
+                <a:latin typeface="+mn-lt"/>
+                <a:ea typeface="+mn-ea"/>
+                <a:cs typeface="+mn-cs"/>
+              </a:defRPr>
+            </a:lvl7pPr>
+            <a:lvl8pPr marL="4571999" indent="-304800" algn="l" defTabSz="1219200" rtl="0" eaLnBrk="1" latinLnBrk="0" hangingPunct="1">
+              <a:spcBef>
+                <a:spcPct val="20000"/>
+              </a:spcBef>
+              <a:buFont typeface="Arial" pitchFamily="34" charset="0"/>
+              <a:buChar char="•"/>
+              <a:defRPr sz="1542" kern="1200">
+                <a:solidFill>
+                  <a:schemeClr val="tx1"/>
+                </a:solidFill>
+                <a:latin typeface="+mn-lt"/>
+                <a:ea typeface="+mn-ea"/>
+                <a:cs typeface="+mn-cs"/>
+              </a:defRPr>
+            </a:lvl8pPr>
+            <a:lvl9pPr marL="5181599" indent="-304800" algn="l" defTabSz="1219200" rtl="0" eaLnBrk="1" latinLnBrk="0" hangingPunct="1">
+              <a:spcBef>
+                <a:spcPct val="20000"/>
+              </a:spcBef>
+              <a:buFont typeface="Arial" pitchFamily="34" charset="0"/>
+              <a:buChar char="•"/>
+              <a:defRPr sz="1542" kern="1200">
+                <a:solidFill>
+                  <a:schemeClr val="tx1"/>
+                </a:solidFill>
+                <a:latin typeface="+mn-lt"/>
+                <a:ea typeface="+mn-ea"/>
+                <a:cs typeface="+mn-cs"/>
+              </a:defRPr>
+            </a:lvl9pPr>
+          </a:lstStyle>
           <a:p>
-            <a:r>
-              <a:rPr lang="zh-CN" altLang="en-US" sz="9600" b="1" dirty="0">
-                <a:latin typeface="FUTURA MEDIUM" panose="020B0602020204020303" pitchFamily="34" charset="-79"/>
-                <a:cs typeface="FUTURA MEDIUM" panose="020B0602020204020303" pitchFamily="34" charset="-79"/>
-              </a:rPr>
-              <a:t>服务器形态</a:t>
-            </a:r>
-            <a:endParaRPr kumimoji="1" lang="zh-CN" altLang="en-US" dirty="0"/>
+            <a:pPr marL="0" indent="0" algn="ctr">
+              <a:buFont typeface="Arial" pitchFamily="34" charset="0"/>
+              <a:buNone/>
+            </a:pPr>
+            <a:r>
+              <a:rPr lang="zh-CN" altLang="en-US" dirty="0"/>
+              <a:t>大 </a:t>
+            </a:r>
+            <a:r>
+              <a:rPr lang="en" altLang="zh-CN" dirty="0"/>
+              <a:t>Z</a:t>
+            </a:r>
+            <a:r>
+              <a:rPr lang="zh-CN" altLang="en-US" dirty="0"/>
+              <a:t> 小 </a:t>
+            </a:r>
+            <a:r>
+              <a:rPr lang="en" altLang="zh-CN" dirty="0"/>
+              <a:t>N</a:t>
+            </a:r>
+            <a:endParaRPr lang="en" dirty="0"/>
+          </a:p>
+        </p:txBody>
+      </p:sp>
+      <p:sp>
+        <p:nvSpPr>
+          <p:cNvPr id="6" name="内容占位符 4">
+            <a:extLst>
+              <a:ext uri="{FF2B5EF4-FFF2-40B4-BE49-F238E27FC236}">
+                <a16:creationId xmlns:a16="http://schemas.microsoft.com/office/drawing/2014/main" id="{7260F325-FA33-4A68-EFA4-4D60B3390E5A}"/>
+              </a:ext>
+            </a:extLst>
+          </p:cNvPr>
+          <p:cNvSpPr txBox="1">
+            <a:spLocks/>
+          </p:cNvSpPr>
+          <p:nvPr/>
+        </p:nvSpPr>
+        <p:spPr>
+          <a:xfrm>
+            <a:off x="7979528" y="1791685"/>
+            <a:ext cx="2766837" cy="589190"/>
+          </a:xfrm>
+          <a:prstGeom prst="rect">
+            <a:avLst/>
+          </a:prstGeom>
+          <a:noFill/>
+        </p:spPr>
+        <p:txBody>
+          <a:bodyPr/>
+          <a:lstStyle>
+            <a:lvl1pPr marL="239106" marR="0" indent="-239106" algn="l" defTabSz="1218804" rtl="0" eaLnBrk="1" fontAlgn="base" latinLnBrk="1" hangingPunct="1">
+              <a:lnSpc>
+                <a:spcPct val="150000"/>
+              </a:lnSpc>
+              <a:spcBef>
+                <a:spcPts val="0"/>
+              </a:spcBef>
+              <a:spcAft>
+                <a:spcPts val="800"/>
+              </a:spcAft>
+              <a:buClr>
+                <a:srgbClr val="92D050"/>
+              </a:buClr>
+              <a:buFont typeface="Arial" pitchFamily="34" charset="0"/>
+              <a:buChar char="•"/>
+              <a:tabLst/>
+              <a:defRPr kumimoji="0" lang="zh-CN" altLang="en-US" sz="2000" b="0" i="0" u="none" strike="noStrike" kern="0" cap="none" spc="0" normalizeH="0" baseline="0" dirty="0">
+                <a:ln>
+                  <a:noFill/>
+                </a:ln>
+                <a:solidFill>
+                  <a:srgbClr val="374154"/>
+                </a:solidFill>
+                <a:effectLst/>
+                <a:uLnTx/>
+                <a:uFillTx/>
+                <a:latin typeface="Gill Sans MT" panose="020B0502020104020203" pitchFamily="34" charset="0"/>
+                <a:ea typeface="微软雅黑" pitchFamily="34" charset="-122"/>
+                <a:cs typeface="+mn-cs"/>
+              </a:defRPr>
+            </a:lvl1pPr>
+            <a:lvl2pPr marL="476096" marR="0" indent="-236990" algn="l" defTabSz="1218804" rtl="0" eaLnBrk="1" fontAlgn="base" latinLnBrk="1" hangingPunct="1">
+              <a:lnSpc>
+                <a:spcPct val="150000"/>
+              </a:lnSpc>
+              <a:spcBef>
+                <a:spcPts val="0"/>
+              </a:spcBef>
+              <a:spcAft>
+                <a:spcPts val="800"/>
+              </a:spcAft>
+              <a:buClr>
+                <a:srgbClr val="92D050"/>
+              </a:buClr>
+              <a:buFont typeface="Arial" panose="020B0604020202020204" pitchFamily="34" charset="0"/>
+              <a:buChar char="◦"/>
+              <a:tabLst/>
+              <a:defRPr kumimoji="0" lang="zh-CN" altLang="en-US" sz="1800" b="0" i="0" u="none" strike="noStrike" kern="0" cap="none" spc="0" normalizeH="0" baseline="0" dirty="0">
+                <a:ln>
+                  <a:noFill/>
+                </a:ln>
+                <a:solidFill>
+                  <a:srgbClr val="374154"/>
+                </a:solidFill>
+                <a:effectLst/>
+                <a:uLnTx/>
+                <a:uFillTx/>
+                <a:latin typeface="Gill Sans MT" panose="020B0502020104020203" pitchFamily="34" charset="0"/>
+                <a:ea typeface="微软雅黑" pitchFamily="34" charset="-122"/>
+                <a:cs typeface="+mn-cs"/>
+              </a:defRPr>
+            </a:lvl2pPr>
+            <a:lvl3pPr marL="833696" marR="0" indent="-236990" algn="l" defTabSz="1218804" rtl="0" eaLnBrk="1" fontAlgn="base" latinLnBrk="1" hangingPunct="1">
+              <a:lnSpc>
+                <a:spcPct val="150000"/>
+              </a:lnSpc>
+              <a:spcBef>
+                <a:spcPts val="0"/>
+              </a:spcBef>
+              <a:spcAft>
+                <a:spcPts val="800"/>
+              </a:spcAft>
+              <a:buClr>
+                <a:srgbClr val="92D050"/>
+              </a:buClr>
+              <a:buFontTx/>
+              <a:buChar char="-"/>
+              <a:tabLst/>
+              <a:defRPr kumimoji="0" lang="zh-CN" altLang="en-US" sz="1600" b="0" i="0" u="none" strike="noStrike" kern="0" cap="none" spc="0" normalizeH="0" baseline="0" dirty="0">
+                <a:ln>
+                  <a:noFill/>
+                </a:ln>
+                <a:solidFill>
+                  <a:srgbClr val="374154"/>
+                </a:solidFill>
+                <a:effectLst/>
+                <a:uLnTx/>
+                <a:uFillTx/>
+                <a:latin typeface="Gill Sans MT" panose="020B0502020104020203" pitchFamily="34" charset="0"/>
+                <a:ea typeface="微软雅黑" pitchFamily="34" charset="-122"/>
+                <a:cs typeface="+mn-cs"/>
+              </a:defRPr>
+            </a:lvl3pPr>
+            <a:lvl4pPr marL="2133600" indent="-304800" algn="l" defTabSz="1219200" rtl="0" eaLnBrk="1" latinLnBrk="0" hangingPunct="1">
+              <a:spcBef>
+                <a:spcPct val="20000"/>
+              </a:spcBef>
+              <a:buFont typeface="Arial" pitchFamily="34" charset="0"/>
+              <a:buChar char="–"/>
+              <a:defRPr sz="1542" kern="1200">
+                <a:solidFill>
+                  <a:schemeClr val="tx1"/>
+                </a:solidFill>
+                <a:latin typeface="+mn-lt"/>
+                <a:ea typeface="+mn-ea"/>
+                <a:cs typeface="+mn-cs"/>
+              </a:defRPr>
+            </a:lvl4pPr>
+            <a:lvl5pPr marL="2743200" indent="-304800" algn="l" defTabSz="1219200" rtl="0" eaLnBrk="1" latinLnBrk="0" hangingPunct="1">
+              <a:spcBef>
+                <a:spcPct val="20000"/>
+              </a:spcBef>
+              <a:buFont typeface="Arial" pitchFamily="34" charset="0"/>
+              <a:buChar char="»"/>
+              <a:defRPr sz="1542" kern="1200">
+                <a:solidFill>
+                  <a:schemeClr val="tx1"/>
+                </a:solidFill>
+                <a:latin typeface="+mn-lt"/>
+                <a:ea typeface="+mn-ea"/>
+                <a:cs typeface="+mn-cs"/>
+              </a:defRPr>
+            </a:lvl5pPr>
+            <a:lvl6pPr marL="3352800" indent="-304800" algn="l" defTabSz="1219200" rtl="0" eaLnBrk="1" latinLnBrk="0" hangingPunct="1">
+              <a:spcBef>
+                <a:spcPct val="20000"/>
+              </a:spcBef>
+              <a:buFont typeface="Arial" pitchFamily="34" charset="0"/>
+              <a:buChar char="•"/>
+              <a:defRPr sz="1542" kern="1200">
+                <a:solidFill>
+                  <a:schemeClr val="tx1"/>
+                </a:solidFill>
+                <a:latin typeface="+mn-lt"/>
+                <a:ea typeface="+mn-ea"/>
+                <a:cs typeface="+mn-cs"/>
+              </a:defRPr>
+            </a:lvl6pPr>
+            <a:lvl7pPr marL="3962399" indent="-304800" algn="l" defTabSz="1219200" rtl="0" eaLnBrk="1" latinLnBrk="0" hangingPunct="1">
+              <a:spcBef>
+                <a:spcPct val="20000"/>
+              </a:spcBef>
+              <a:buFont typeface="Arial" pitchFamily="34" charset="0"/>
+              <a:buChar char="•"/>
+              <a:defRPr sz="1542" kern="1200">
+                <a:solidFill>
+                  <a:schemeClr val="tx1"/>
+                </a:solidFill>
+                <a:latin typeface="+mn-lt"/>
+                <a:ea typeface="+mn-ea"/>
+                <a:cs typeface="+mn-cs"/>
+              </a:defRPr>
+            </a:lvl7pPr>
+            <a:lvl8pPr marL="4571999" indent="-304800" algn="l" defTabSz="1219200" rtl="0" eaLnBrk="1" latinLnBrk="0" hangingPunct="1">
+              <a:spcBef>
+                <a:spcPct val="20000"/>
+              </a:spcBef>
+              <a:buFont typeface="Arial" pitchFamily="34" charset="0"/>
+              <a:buChar char="•"/>
+              <a:defRPr sz="1542" kern="1200">
+                <a:solidFill>
+                  <a:schemeClr val="tx1"/>
+                </a:solidFill>
+                <a:latin typeface="+mn-lt"/>
+                <a:ea typeface="+mn-ea"/>
+                <a:cs typeface="+mn-cs"/>
+              </a:defRPr>
+            </a:lvl8pPr>
+            <a:lvl9pPr marL="5181599" indent="-304800" algn="l" defTabSz="1219200" rtl="0" eaLnBrk="1" latinLnBrk="0" hangingPunct="1">
+              <a:spcBef>
+                <a:spcPct val="20000"/>
+              </a:spcBef>
+              <a:buFont typeface="Arial" pitchFamily="34" charset="0"/>
+              <a:buChar char="•"/>
+              <a:defRPr sz="1542" kern="1200">
+                <a:solidFill>
+                  <a:schemeClr val="tx1"/>
+                </a:solidFill>
+                <a:latin typeface="+mn-lt"/>
+                <a:ea typeface="+mn-ea"/>
+                <a:cs typeface="+mn-cs"/>
+              </a:defRPr>
+            </a:lvl9pPr>
+          </a:lstStyle>
+          <a:p>
+            <a:pPr marL="0" indent="0" algn="ctr">
+              <a:buFont typeface="Arial" pitchFamily="34" charset="0"/>
+              <a:buNone/>
+            </a:pPr>
+            <a:r>
+              <a:rPr lang="zh-CN" altLang="en-US" dirty="0"/>
+              <a:t>大 </a:t>
+            </a:r>
+            <a:r>
+              <a:rPr lang="en" altLang="zh-CN" dirty="0"/>
+              <a:t>N </a:t>
+            </a:r>
+            <a:r>
+              <a:rPr lang="zh-CN" altLang="en-US" dirty="0"/>
+              <a:t>小 </a:t>
+            </a:r>
+            <a:r>
+              <a:rPr lang="en" altLang="zh-CN" dirty="0"/>
+              <a:t>Z</a:t>
+            </a:r>
+            <a:endParaRPr lang="en" dirty="0"/>
           </a:p>
         </p:txBody>
       </p:sp>
     </p:spTree>
     <p:extLst>
       <p:ext uri="{BB962C8B-B14F-4D97-AF65-F5344CB8AC3E}">
-        <p14:creationId xmlns:p14="http://schemas.microsoft.com/office/powerpoint/2010/main" val="2645994994"/>
+        <p14:creationId xmlns:p14="http://schemas.microsoft.com/office/powerpoint/2010/main" val="19411478"/>
       </p:ext>
     </p:extLst>
   </p:cSld>
@@ -25536,10 +26499,10 @@
       </p:grpSpPr>
       <p:sp>
         <p:nvSpPr>
-          <p:cNvPr id="4" name="标题 3">
+          <p:cNvPr id="6" name="标题 5">
             <a:extLst>
               <a:ext uri="{FF2B5EF4-FFF2-40B4-BE49-F238E27FC236}">
-                <a16:creationId xmlns:a16="http://schemas.microsoft.com/office/drawing/2014/main" id="{C54A829C-4476-8FB6-F539-CF2269A3E867}"/>
+                <a16:creationId xmlns:a16="http://schemas.microsoft.com/office/drawing/2014/main" id="{FAAE688D-BB72-5F87-80BF-A9946FF17DC8}"/>
               </a:ext>
             </a:extLst>
           </p:cNvPr>
@@ -25556,225 +26519,547 @@
           <a:lstStyle/>
           <a:p>
             <a:r>
+              <a:rPr lang="zh-CN" altLang="en-US" dirty="0"/>
+              <a:t>矩阵分块 </a:t>
+            </a:r>
+            <a:r>
               <a:rPr lang="en-US" altLang="zh-CN" dirty="0"/>
-              <a:t>AI</a:t>
-            </a:r>
-            <a:r>
-              <a:rPr lang="zh-CN" altLang="en-US" dirty="0"/>
-              <a:t> 服务器的一般架构</a:t>
-            </a:r>
+              <a:t>Padding</a:t>
+            </a:r>
+            <a:endParaRPr lang="zh-CN" altLang="en-US" dirty="0"/>
           </a:p>
         </p:txBody>
       </p:sp>
-      <p:sp>
-        <p:nvSpPr>
+      <p:pic>
+        <p:nvPicPr>
           <p:cNvPr id="5" name="内容占位符 4">
             <a:extLst>
               <a:ext uri="{FF2B5EF4-FFF2-40B4-BE49-F238E27FC236}">
-                <a16:creationId xmlns:a16="http://schemas.microsoft.com/office/drawing/2014/main" id="{C42F0B27-A214-28DC-1832-D21989DC1486}"/>
+                <a16:creationId xmlns:a16="http://schemas.microsoft.com/office/drawing/2014/main" id="{FF1606DA-D24F-F100-9599-41DC9387A23D}"/>
               </a:ext>
             </a:extLst>
           </p:cNvPr>
-          <p:cNvSpPr>
-            <a:spLocks noGrp="1"/>
-          </p:cNvSpPr>
+          <p:cNvPicPr>
+            <a:picLocks noGrp="1" noChangeAspect="1"/>
+          </p:cNvPicPr>
           <p:nvPr>
             <p:ph sz="half" idx="1"/>
           </p:nvPr>
+        </p:nvPicPr>
+        <p:blipFill>
+          <a:blip r:embed="rId2">
+            <a:extLst>
+              <a:ext uri="{28A0092B-C50C-407E-A947-70E740481C1C}">
+                <a14:useLocalDpi xmlns:a14="http://schemas.microsoft.com/office/drawing/2010/main" val="0"/>
+              </a:ext>
+            </a:extLst>
+          </a:blip>
+          <a:stretch>
+            <a:fillRect/>
+          </a:stretch>
+        </p:blipFill>
+        <p:spPr>
+          <a:xfrm>
+            <a:off x="1836562" y="2022442"/>
+            <a:ext cx="8523637" cy="4368851"/>
+          </a:xfrm>
+        </p:spPr>
+      </p:pic>
+      <p:grpSp>
+        <p:nvGrpSpPr>
+          <p:cNvPr id="10" name="组合 9">
+            <a:extLst>
+              <a:ext uri="{FF2B5EF4-FFF2-40B4-BE49-F238E27FC236}">
+                <a16:creationId xmlns:a16="http://schemas.microsoft.com/office/drawing/2014/main" id="{5FCCA751-30F0-F88A-D9CE-D60715D731EC}"/>
+              </a:ext>
+            </a:extLst>
+          </p:cNvPr>
+          <p:cNvGrpSpPr/>
+          <p:nvPr/>
+        </p:nvGrpSpPr>
+        <p:grpSpPr>
+          <a:xfrm>
+            <a:off x="1726058" y="1877749"/>
+            <a:ext cx="2147089" cy="4689897"/>
+            <a:chOff x="1109605" y="1226925"/>
+            <a:chExt cx="2445044" cy="5340722"/>
+          </a:xfrm>
+        </p:grpSpPr>
+        <p:pic>
+          <p:nvPicPr>
+            <p:cNvPr id="2" name="内容占位符 4">
+              <a:extLst>
+                <a:ext uri="{FF2B5EF4-FFF2-40B4-BE49-F238E27FC236}">
+                  <a16:creationId xmlns:a16="http://schemas.microsoft.com/office/drawing/2014/main" id="{AB41FA80-9DDB-C4A6-04F4-946C07BB3400}"/>
+                </a:ext>
+              </a:extLst>
+            </p:cNvPr>
+            <p:cNvPicPr>
+              <a:picLocks noChangeAspect="1"/>
+            </p:cNvPicPr>
+            <p:nvPr/>
+          </p:nvPicPr>
+          <p:blipFill rotWithShape="1">
+            <a:blip r:embed="rId3">
+              <a:extLst>
+                <a:ext uri="{28A0092B-C50C-407E-A947-70E740481C1C}">
+                  <a14:useLocalDpi xmlns:a14="http://schemas.microsoft.com/office/drawing/2010/main" val="0"/>
+                </a:ext>
+              </a:extLst>
+            </a:blip>
+            <a:srcRect l="4942" t="11956" r="66485" b="9624"/>
+            <a:stretch/>
+          </p:blipFill>
+          <p:spPr>
+            <a:xfrm>
+              <a:off x="1109608" y="1226925"/>
+              <a:ext cx="1100839" cy="1125858"/>
+            </a:xfrm>
+            <a:prstGeom prst="rect">
+              <a:avLst/>
+            </a:prstGeom>
+            <a:noFill/>
+          </p:spPr>
+        </p:pic>
+        <p:pic>
+          <p:nvPicPr>
+            <p:cNvPr id="3" name="内容占位符 4">
+              <a:extLst>
+                <a:ext uri="{FF2B5EF4-FFF2-40B4-BE49-F238E27FC236}">
+                  <a16:creationId xmlns:a16="http://schemas.microsoft.com/office/drawing/2014/main" id="{49373342-D640-AB9A-4B45-3FB69DAE84E8}"/>
+                </a:ext>
+              </a:extLst>
+            </p:cNvPr>
+            <p:cNvPicPr>
+              <a:picLocks noChangeAspect="1"/>
+            </p:cNvPicPr>
+            <p:nvPr/>
+          </p:nvPicPr>
+          <p:blipFill rotWithShape="1">
+            <a:blip r:embed="rId3">
+              <a:extLst>
+                <a:ext uri="{28A0092B-C50C-407E-A947-70E740481C1C}">
+                  <a14:useLocalDpi xmlns:a14="http://schemas.microsoft.com/office/drawing/2010/main" val="0"/>
+                </a:ext>
+              </a:extLst>
+            </a:blip>
+            <a:srcRect l="4942" t="11956" r="66485" b="9624"/>
+            <a:stretch/>
+          </p:blipFill>
+          <p:spPr>
+            <a:xfrm>
+              <a:off x="1109607" y="4091703"/>
+              <a:ext cx="1100839" cy="1125858"/>
+            </a:xfrm>
+            <a:prstGeom prst="rect">
+              <a:avLst/>
+            </a:prstGeom>
+            <a:noFill/>
+          </p:spPr>
+        </p:pic>
+        <p:pic>
+          <p:nvPicPr>
+            <p:cNvPr id="4" name="内容占位符 4">
+              <a:extLst>
+                <a:ext uri="{FF2B5EF4-FFF2-40B4-BE49-F238E27FC236}">
+                  <a16:creationId xmlns:a16="http://schemas.microsoft.com/office/drawing/2014/main" id="{0B0BB64E-57E0-1E48-F58E-53FCADBD1653}"/>
+                </a:ext>
+              </a:extLst>
+            </p:cNvPr>
+            <p:cNvPicPr>
+              <a:picLocks noChangeAspect="1"/>
+            </p:cNvPicPr>
+            <p:nvPr/>
+          </p:nvPicPr>
+          <p:blipFill rotWithShape="1">
+            <a:blip r:embed="rId3">
+              <a:extLst>
+                <a:ext uri="{28A0092B-C50C-407E-A947-70E740481C1C}">
+                  <a14:useLocalDpi xmlns:a14="http://schemas.microsoft.com/office/drawing/2010/main" val="0"/>
+                </a:ext>
+              </a:extLst>
+            </a:blip>
+            <a:srcRect l="4942" t="11956" r="66485" b="9624"/>
+            <a:stretch/>
+          </p:blipFill>
+          <p:spPr>
+            <a:xfrm>
+              <a:off x="1109606" y="2547269"/>
+              <a:ext cx="1100839" cy="1125858"/>
+            </a:xfrm>
+            <a:prstGeom prst="rect">
+              <a:avLst/>
+            </a:prstGeom>
+            <a:noFill/>
+          </p:spPr>
+        </p:pic>
+        <p:pic>
+          <p:nvPicPr>
+            <p:cNvPr id="7" name="内容占位符 4">
+              <a:extLst>
+                <a:ext uri="{FF2B5EF4-FFF2-40B4-BE49-F238E27FC236}">
+                  <a16:creationId xmlns:a16="http://schemas.microsoft.com/office/drawing/2014/main" id="{FE30529C-E479-A9B9-4CC8-F2A8F3F2D218}"/>
+                </a:ext>
+              </a:extLst>
+            </p:cNvPr>
+            <p:cNvPicPr>
+              <a:picLocks noChangeAspect="1"/>
+            </p:cNvPicPr>
+            <p:nvPr/>
+          </p:nvPicPr>
+          <p:blipFill rotWithShape="1">
+            <a:blip r:embed="rId3">
+              <a:extLst>
+                <a:ext uri="{28A0092B-C50C-407E-A947-70E740481C1C}">
+                  <a14:useLocalDpi xmlns:a14="http://schemas.microsoft.com/office/drawing/2010/main" val="0"/>
+                </a:ext>
+              </a:extLst>
+            </a:blip>
+            <a:srcRect l="4942" t="11956" r="66485" b="9624"/>
+            <a:stretch/>
+          </p:blipFill>
+          <p:spPr>
+            <a:xfrm>
+              <a:off x="2453810" y="2547269"/>
+              <a:ext cx="1100839" cy="1125858"/>
+            </a:xfrm>
+            <a:prstGeom prst="rect">
+              <a:avLst/>
+            </a:prstGeom>
+            <a:noFill/>
+          </p:spPr>
+        </p:pic>
+        <p:pic>
+          <p:nvPicPr>
+            <p:cNvPr id="8" name="内容占位符 4">
+              <a:extLst>
+                <a:ext uri="{FF2B5EF4-FFF2-40B4-BE49-F238E27FC236}">
+                  <a16:creationId xmlns:a16="http://schemas.microsoft.com/office/drawing/2014/main" id="{E6411546-61EA-C733-B191-FA003D67B194}"/>
+                </a:ext>
+              </a:extLst>
+            </p:cNvPr>
+            <p:cNvPicPr>
+              <a:picLocks noChangeAspect="1"/>
+            </p:cNvPicPr>
+            <p:nvPr/>
+          </p:nvPicPr>
+          <p:blipFill rotWithShape="1">
+            <a:blip r:embed="rId3">
+              <a:extLst>
+                <a:ext uri="{28A0092B-C50C-407E-A947-70E740481C1C}">
+                  <a14:useLocalDpi xmlns:a14="http://schemas.microsoft.com/office/drawing/2010/main" val="0"/>
+                </a:ext>
+              </a:extLst>
+            </a:blip>
+            <a:srcRect l="4942" t="11956" r="66485" b="9624"/>
+            <a:stretch/>
+          </p:blipFill>
+          <p:spPr>
+            <a:xfrm>
+              <a:off x="1109605" y="5412047"/>
+              <a:ext cx="1100839" cy="1125858"/>
+            </a:xfrm>
+            <a:prstGeom prst="rect">
+              <a:avLst/>
+            </a:prstGeom>
+            <a:noFill/>
+          </p:spPr>
+        </p:pic>
+        <p:pic>
+          <p:nvPicPr>
+            <p:cNvPr id="9" name="内容占位符 4">
+              <a:extLst>
+                <a:ext uri="{FF2B5EF4-FFF2-40B4-BE49-F238E27FC236}">
+                  <a16:creationId xmlns:a16="http://schemas.microsoft.com/office/drawing/2014/main" id="{F878324D-CB51-7B98-A9EF-AD08E0308264}"/>
+                </a:ext>
+              </a:extLst>
+            </p:cNvPr>
+            <p:cNvPicPr>
+              <a:picLocks noChangeAspect="1"/>
+            </p:cNvPicPr>
+            <p:nvPr/>
+          </p:nvPicPr>
+          <p:blipFill rotWithShape="1">
+            <a:blip r:embed="rId3">
+              <a:extLst>
+                <a:ext uri="{28A0092B-C50C-407E-A947-70E740481C1C}">
+                  <a14:useLocalDpi xmlns:a14="http://schemas.microsoft.com/office/drawing/2010/main" val="0"/>
+                </a:ext>
+              </a:extLst>
+            </a:blip>
+            <a:srcRect l="4942" t="11956" r="66485" b="9624"/>
+            <a:stretch/>
+          </p:blipFill>
+          <p:spPr>
+            <a:xfrm>
+              <a:off x="2453809" y="5441789"/>
+              <a:ext cx="1100839" cy="1125858"/>
+            </a:xfrm>
+            <a:prstGeom prst="rect">
+              <a:avLst/>
+            </a:prstGeom>
+            <a:noFill/>
+          </p:spPr>
+        </p:pic>
+      </p:grpSp>
+      <p:sp>
+        <p:nvSpPr>
+          <p:cNvPr id="11" name="内容占位符 4">
+            <a:extLst>
+              <a:ext uri="{FF2B5EF4-FFF2-40B4-BE49-F238E27FC236}">
+                <a16:creationId xmlns:a16="http://schemas.microsoft.com/office/drawing/2014/main" id="{D4743B7B-691F-B49F-A4D9-8FEA57BF0FB5}"/>
+              </a:ext>
+            </a:extLst>
+          </p:cNvPr>
+          <p:cNvSpPr txBox="1">
+            <a:spLocks/>
+          </p:cNvSpPr>
+          <p:nvPr/>
         </p:nvSpPr>
         <p:spPr>
           <a:xfrm>
-            <a:off x="7346022" y="1360170"/>
-            <a:ext cx="4241085" cy="4994910"/>
+            <a:off x="623635" y="1292298"/>
+            <a:ext cx="10963473" cy="589190"/>
           </a:xfrm>
+          <a:prstGeom prst="rect">
+            <a:avLst/>
+          </a:prstGeom>
+          <a:noFill/>
         </p:spPr>
         <p:txBody>
           <a:bodyPr/>
-          <a:lstStyle/>
+          <a:lstStyle>
+            <a:lvl1pPr marL="239106" marR="0" indent="-239106" algn="l" defTabSz="1218804" rtl="0" eaLnBrk="1" fontAlgn="base" latinLnBrk="1" hangingPunct="1">
+              <a:lnSpc>
+                <a:spcPct val="150000"/>
+              </a:lnSpc>
+              <a:spcBef>
+                <a:spcPts val="0"/>
+              </a:spcBef>
+              <a:spcAft>
+                <a:spcPts val="800"/>
+              </a:spcAft>
+              <a:buClr>
+                <a:srgbClr val="92D050"/>
+              </a:buClr>
+              <a:buFont typeface="Arial" pitchFamily="34" charset="0"/>
+              <a:buChar char="•"/>
+              <a:tabLst/>
+              <a:defRPr kumimoji="0" lang="zh-CN" altLang="en-US" sz="2000" b="0" i="0" u="none" strike="noStrike" kern="0" cap="none" spc="0" normalizeH="0" baseline="0" dirty="0">
+                <a:ln>
+                  <a:noFill/>
+                </a:ln>
+                <a:solidFill>
+                  <a:srgbClr val="374154"/>
+                </a:solidFill>
+                <a:effectLst/>
+                <a:uLnTx/>
+                <a:uFillTx/>
+                <a:latin typeface="Gill Sans MT" panose="020B0502020104020203" pitchFamily="34" charset="0"/>
+                <a:ea typeface="微软雅黑" pitchFamily="34" charset="-122"/>
+                <a:cs typeface="+mn-cs"/>
+              </a:defRPr>
+            </a:lvl1pPr>
+            <a:lvl2pPr marL="476096" marR="0" indent="-236990" algn="l" defTabSz="1218804" rtl="0" eaLnBrk="1" fontAlgn="base" latinLnBrk="1" hangingPunct="1">
+              <a:lnSpc>
+                <a:spcPct val="150000"/>
+              </a:lnSpc>
+              <a:spcBef>
+                <a:spcPts val="0"/>
+              </a:spcBef>
+              <a:spcAft>
+                <a:spcPts val="800"/>
+              </a:spcAft>
+              <a:buClr>
+                <a:srgbClr val="92D050"/>
+              </a:buClr>
+              <a:buFont typeface="Arial" panose="020B0604020202020204" pitchFamily="34" charset="0"/>
+              <a:buChar char="◦"/>
+              <a:tabLst/>
+              <a:defRPr kumimoji="0" lang="zh-CN" altLang="en-US" sz="1800" b="0" i="0" u="none" strike="noStrike" kern="0" cap="none" spc="0" normalizeH="0" baseline="0" dirty="0">
+                <a:ln>
+                  <a:noFill/>
+                </a:ln>
+                <a:solidFill>
+                  <a:srgbClr val="374154"/>
+                </a:solidFill>
+                <a:effectLst/>
+                <a:uLnTx/>
+                <a:uFillTx/>
+                <a:latin typeface="Gill Sans MT" panose="020B0502020104020203" pitchFamily="34" charset="0"/>
+                <a:ea typeface="微软雅黑" pitchFamily="34" charset="-122"/>
+                <a:cs typeface="+mn-cs"/>
+              </a:defRPr>
+            </a:lvl2pPr>
+            <a:lvl3pPr marL="833696" marR="0" indent="-236990" algn="l" defTabSz="1218804" rtl="0" eaLnBrk="1" fontAlgn="base" latinLnBrk="1" hangingPunct="1">
+              <a:lnSpc>
+                <a:spcPct val="150000"/>
+              </a:lnSpc>
+              <a:spcBef>
+                <a:spcPts val="0"/>
+              </a:spcBef>
+              <a:spcAft>
+                <a:spcPts val="800"/>
+              </a:spcAft>
+              <a:buClr>
+                <a:srgbClr val="92D050"/>
+              </a:buClr>
+              <a:buFontTx/>
+              <a:buChar char="-"/>
+              <a:tabLst/>
+              <a:defRPr kumimoji="0" lang="zh-CN" altLang="en-US" sz="1600" b="0" i="0" u="none" strike="noStrike" kern="0" cap="none" spc="0" normalizeH="0" baseline="0" dirty="0">
+                <a:ln>
+                  <a:noFill/>
+                </a:ln>
+                <a:solidFill>
+                  <a:srgbClr val="374154"/>
+                </a:solidFill>
+                <a:effectLst/>
+                <a:uLnTx/>
+                <a:uFillTx/>
+                <a:latin typeface="Gill Sans MT" panose="020B0502020104020203" pitchFamily="34" charset="0"/>
+                <a:ea typeface="微软雅黑" pitchFamily="34" charset="-122"/>
+                <a:cs typeface="+mn-cs"/>
+              </a:defRPr>
+            </a:lvl3pPr>
+            <a:lvl4pPr marL="2133600" indent="-304800" algn="l" defTabSz="1219200" rtl="0" eaLnBrk="1" latinLnBrk="0" hangingPunct="1">
+              <a:spcBef>
+                <a:spcPct val="20000"/>
+              </a:spcBef>
+              <a:buFont typeface="Arial" pitchFamily="34" charset="0"/>
+              <a:buChar char="–"/>
+              <a:defRPr sz="1542" kern="1200">
+                <a:solidFill>
+                  <a:schemeClr val="tx1"/>
+                </a:solidFill>
+                <a:latin typeface="+mn-lt"/>
+                <a:ea typeface="+mn-ea"/>
+                <a:cs typeface="+mn-cs"/>
+              </a:defRPr>
+            </a:lvl4pPr>
+            <a:lvl5pPr marL="2743200" indent="-304800" algn="l" defTabSz="1219200" rtl="0" eaLnBrk="1" latinLnBrk="0" hangingPunct="1">
+              <a:spcBef>
+                <a:spcPct val="20000"/>
+              </a:spcBef>
+              <a:buFont typeface="Arial" pitchFamily="34" charset="0"/>
+              <a:buChar char="»"/>
+              <a:defRPr sz="1542" kern="1200">
+                <a:solidFill>
+                  <a:schemeClr val="tx1"/>
+                </a:solidFill>
+                <a:latin typeface="+mn-lt"/>
+                <a:ea typeface="+mn-ea"/>
+                <a:cs typeface="+mn-cs"/>
+              </a:defRPr>
+            </a:lvl5pPr>
+            <a:lvl6pPr marL="3352800" indent="-304800" algn="l" defTabSz="1219200" rtl="0" eaLnBrk="1" latinLnBrk="0" hangingPunct="1">
+              <a:spcBef>
+                <a:spcPct val="20000"/>
+              </a:spcBef>
+              <a:buFont typeface="Arial" pitchFamily="34" charset="0"/>
+              <a:buChar char="•"/>
+              <a:defRPr sz="1542" kern="1200">
+                <a:solidFill>
+                  <a:schemeClr val="tx1"/>
+                </a:solidFill>
+                <a:latin typeface="+mn-lt"/>
+                <a:ea typeface="+mn-ea"/>
+                <a:cs typeface="+mn-cs"/>
+              </a:defRPr>
+            </a:lvl6pPr>
+            <a:lvl7pPr marL="3962399" indent="-304800" algn="l" defTabSz="1219200" rtl="0" eaLnBrk="1" latinLnBrk="0" hangingPunct="1">
+              <a:spcBef>
+                <a:spcPct val="20000"/>
+              </a:spcBef>
+              <a:buFont typeface="Arial" pitchFamily="34" charset="0"/>
+              <a:buChar char="•"/>
+              <a:defRPr sz="1542" kern="1200">
+                <a:solidFill>
+                  <a:schemeClr val="tx1"/>
+                </a:solidFill>
+                <a:latin typeface="+mn-lt"/>
+                <a:ea typeface="+mn-ea"/>
+                <a:cs typeface="+mn-cs"/>
+              </a:defRPr>
+            </a:lvl7pPr>
+            <a:lvl8pPr marL="4571999" indent="-304800" algn="l" defTabSz="1219200" rtl="0" eaLnBrk="1" latinLnBrk="0" hangingPunct="1">
+              <a:spcBef>
+                <a:spcPct val="20000"/>
+              </a:spcBef>
+              <a:buFont typeface="Arial" pitchFamily="34" charset="0"/>
+              <a:buChar char="•"/>
+              <a:defRPr sz="1542" kern="1200">
+                <a:solidFill>
+                  <a:schemeClr val="tx1"/>
+                </a:solidFill>
+                <a:latin typeface="+mn-lt"/>
+                <a:ea typeface="+mn-ea"/>
+                <a:cs typeface="+mn-cs"/>
+              </a:defRPr>
+            </a:lvl8pPr>
+            <a:lvl9pPr marL="5181599" indent="-304800" algn="l" defTabSz="1219200" rtl="0" eaLnBrk="1" latinLnBrk="0" hangingPunct="1">
+              <a:spcBef>
+                <a:spcPct val="20000"/>
+              </a:spcBef>
+              <a:buFont typeface="Arial" pitchFamily="34" charset="0"/>
+              <a:buChar char="•"/>
+              <a:defRPr sz="1542" kern="1200">
+                <a:solidFill>
+                  <a:schemeClr val="tx1"/>
+                </a:solidFill>
+                <a:latin typeface="+mn-lt"/>
+                <a:ea typeface="+mn-ea"/>
+                <a:cs typeface="+mn-cs"/>
+              </a:defRPr>
+            </a:lvl9pPr>
+          </a:lstStyle>
           <a:p>
             <a:r>
+              <a:rPr lang="en" altLang="zh-CN" dirty="0"/>
+              <a:t>A</a:t>
+            </a:r>
+            <a:r>
+              <a:rPr lang="en" dirty="0"/>
+              <a:t> </a:t>
+            </a:r>
+            <a:r>
               <a:rPr lang="zh-CN" altLang="en-US" dirty="0"/>
-              <a:t>一般形态，</a:t>
+              <a:t>和 </a:t>
+            </a:r>
+            <a:r>
+              <a:rPr lang="en" altLang="zh-CN" dirty="0"/>
+              <a:t>B</a:t>
+            </a:r>
+            <a:r>
+              <a:rPr lang="en" dirty="0"/>
+              <a:t> </a:t>
+            </a:r>
+            <a:r>
+              <a:rPr lang="zh-CN" altLang="en-US" dirty="0"/>
+              <a:t>都等分成同样大小块，每一块是 </a:t>
             </a:r>
             <a:r>
               <a:rPr lang="en-US" altLang="zh-CN" dirty="0"/>
-              <a:t>CPU</a:t>
+              <a:t>16</a:t>
+            </a:r>
+            <a:r>
+              <a:rPr lang="en" altLang="zh-CN" dirty="0"/>
+              <a:t>x16 </a:t>
             </a:r>
             <a:r>
               <a:rPr lang="zh-CN" altLang="en-US" dirty="0"/>
-              <a:t> </a:t>
-            </a:r>
-            <a:r>
-              <a:rPr lang="en-US" altLang="zh-CN" dirty="0"/>
-              <a:t>named</a:t>
-            </a:r>
-            <a:r>
-              <a:rPr lang="zh-CN" altLang="en-US" dirty="0"/>
-              <a:t> </a:t>
-            </a:r>
-            <a:r>
-              <a:rPr lang="en-US" altLang="zh-CN" dirty="0"/>
-              <a:t>host</a:t>
-            </a:r>
-            <a:r>
-              <a:rPr lang="zh-CN" altLang="en-US" dirty="0"/>
-              <a:t>，</a:t>
-            </a:r>
-            <a:r>
-              <a:rPr lang="en-US" altLang="zh-CN" dirty="0"/>
-              <a:t>NPU/GPU</a:t>
-            </a:r>
-            <a:r>
-              <a:rPr lang="zh-CN" altLang="en-US" dirty="0"/>
-              <a:t> </a:t>
-            </a:r>
-            <a:r>
-              <a:rPr lang="en-US" altLang="zh-CN" dirty="0"/>
-              <a:t>named</a:t>
-            </a:r>
-            <a:r>
-              <a:rPr lang="zh-CN" altLang="en-US" dirty="0"/>
-              <a:t> </a:t>
-            </a:r>
-            <a:r>
-              <a:rPr lang="en-US" altLang="zh-CN" dirty="0"/>
-              <a:t>Devices</a:t>
-            </a:r>
-            <a:r>
-              <a:rPr lang="zh-CN" altLang="en-US" dirty="0"/>
-              <a:t>，</a:t>
-            </a:r>
-            <a:r>
-              <a:rPr lang="en-US" altLang="zh-CN" dirty="0"/>
-              <a:t>CPU </a:t>
-            </a:r>
-            <a:r>
-              <a:rPr lang="zh-CN" altLang="en-US" dirty="0"/>
-              <a:t>和</a:t>
-            </a:r>
-            <a:r>
-              <a:rPr lang="en-US" altLang="zh-CN" dirty="0"/>
-              <a:t> NPU </a:t>
-            </a:r>
-            <a:r>
-              <a:rPr lang="zh-CN" altLang="en-US" dirty="0"/>
-              <a:t>各有自己的本地内存；</a:t>
-            </a:r>
-            <a:endParaRPr lang="en-US" altLang="zh-CN" dirty="0"/>
-          </a:p>
-          <a:p>
-            <a:r>
-              <a:rPr lang="zh-CN" altLang="en-US" dirty="0"/>
-              <a:t>在 </a:t>
-            </a:r>
-            <a:r>
-              <a:rPr lang="en-US" altLang="zh-CN" dirty="0"/>
-              <a:t>AI</a:t>
-            </a:r>
-            <a:r>
-              <a:rPr lang="zh-CN" altLang="en-US" dirty="0"/>
-              <a:t> 集群下，</a:t>
-            </a:r>
-            <a:r>
-              <a:rPr lang="en-US" altLang="zh-CN" dirty="0"/>
-              <a:t>NPU</a:t>
-            </a:r>
-            <a:r>
-              <a:rPr lang="zh-CN" altLang="en-US" dirty="0"/>
-              <a:t> 之间需要高速交换数据，为了保证通信性能，</a:t>
-            </a:r>
-            <a:r>
-              <a:rPr lang="en-US" altLang="zh-CN" dirty="0"/>
-              <a:t>NPU</a:t>
-            </a:r>
-            <a:r>
-              <a:rPr lang="zh-CN" altLang="en-US" dirty="0"/>
-              <a:t> 之间设计专用高速互联通道；</a:t>
-            </a:r>
-            <a:endParaRPr lang="en-US" altLang="zh-CN" dirty="0"/>
-          </a:p>
-          <a:p>
-            <a:r>
-              <a:rPr lang="en-US" altLang="zh-CN" dirty="0"/>
-              <a:t>Ascend</a:t>
-            </a:r>
-            <a:r>
-              <a:rPr lang="zh-CN" altLang="en-US" dirty="0"/>
-              <a:t> 服务器 </a:t>
-            </a:r>
-            <a:r>
-              <a:rPr lang="en-US" altLang="zh-CN" dirty="0"/>
-              <a:t>NPU </a:t>
-            </a:r>
-            <a:r>
-              <a:rPr lang="zh-CN" altLang="en-US" dirty="0"/>
-              <a:t>卡间通过灵渠总线互联，每张卡出</a:t>
-            </a:r>
-            <a:r>
-              <a:rPr lang="en-US" altLang="zh-CN" dirty="0"/>
-              <a:t> Eth </a:t>
-            </a:r>
-            <a:r>
-              <a:rPr lang="zh-CN" altLang="en-US" dirty="0"/>
-              <a:t>网口，连接到</a:t>
-            </a:r>
-            <a:r>
-              <a:rPr lang="en-US" altLang="zh-CN" dirty="0"/>
-              <a:t> AI </a:t>
-            </a:r>
-            <a:r>
-              <a:rPr lang="zh-CN" altLang="en-US" dirty="0"/>
-              <a:t>参数面，通过</a:t>
-            </a:r>
-            <a:r>
-              <a:rPr lang="en-US" altLang="zh-CN" dirty="0"/>
-              <a:t> ROCE </a:t>
-            </a:r>
-            <a:r>
-              <a:rPr lang="zh-CN" altLang="en-US" dirty="0"/>
-              <a:t>互联。</a:t>
-            </a:r>
-            <a:endParaRPr lang="en-US" altLang="zh-CN" dirty="0"/>
+              <a:t>子矩阵，排不满的地方可以通过补零实现。</a:t>
+            </a:r>
           </a:p>
           <a:p>
             <a:endParaRPr lang="zh-CN" altLang="en-US" dirty="0"/>
           </a:p>
         </p:txBody>
       </p:sp>
-      <p:pic>
-        <p:nvPicPr>
-          <p:cNvPr id="3" name="图片 2">
-            <a:extLst>
-              <a:ext uri="{FF2B5EF4-FFF2-40B4-BE49-F238E27FC236}">
-                <a16:creationId xmlns:a16="http://schemas.microsoft.com/office/drawing/2014/main" id="{1E9370A3-FFCA-705E-3AD5-F8F32D017736}"/>
-              </a:ext>
-            </a:extLst>
-          </p:cNvPr>
-          <p:cNvPicPr>
-            <a:picLocks noChangeAspect="1"/>
-          </p:cNvPicPr>
-          <p:nvPr/>
-        </p:nvPicPr>
-        <p:blipFill>
-          <a:blip r:embed="rId2"/>
-          <a:stretch>
-            <a:fillRect/>
-          </a:stretch>
-        </p:blipFill>
-        <p:spPr>
-          <a:xfrm>
-            <a:off x="496640" y="1634902"/>
-            <a:ext cx="6479514" cy="4088482"/>
-          </a:xfrm>
-          <a:prstGeom prst="rect">
-            <a:avLst/>
-          </a:prstGeom>
-        </p:spPr>
-      </p:pic>
     </p:spTree>
     <p:extLst>
       <p:ext uri="{BB962C8B-B14F-4D97-AF65-F5344CB8AC3E}">
-        <p14:creationId xmlns:p14="http://schemas.microsoft.com/office/powerpoint/2010/main" val="1622871534"/>
+        <p14:creationId xmlns:p14="http://schemas.microsoft.com/office/powerpoint/2010/main" val="1857512827"/>
       </p:ext>
     </p:extLst>
   </p:cSld>
@@ -25815,10 +27100,10 @@
       </p:grpSpPr>
       <p:sp>
         <p:nvSpPr>
-          <p:cNvPr id="6" name="标题 5">
+          <p:cNvPr id="4" name="标题 3">
             <a:extLst>
               <a:ext uri="{FF2B5EF4-FFF2-40B4-BE49-F238E27FC236}">
-                <a16:creationId xmlns:a16="http://schemas.microsoft.com/office/drawing/2014/main" id="{D912E80B-1697-530D-41F5-E3BE3E678F6A}"/>
+                <a16:creationId xmlns:a16="http://schemas.microsoft.com/office/drawing/2014/main" id="{F21CA6FA-46F2-5238-683B-1C2BC9CA88F8}"/>
               </a:ext>
             </a:extLst>
           </p:cNvPr>
@@ -25835,25 +27120,32 @@
           <a:lstStyle/>
           <a:p>
             <a:r>
-              <a:rPr lang="zh-CN" altLang="en-US" i="0" dirty="0">
-                <a:effectLst/>
-                <a:latin typeface="Helvetica Neue" panose="02000503000000020004" pitchFamily="2" charset="0"/>
-              </a:rPr>
-              <a:t>昇腾全栈 </a:t>
-            </a:r>
-            <a:r>
-              <a:rPr lang="en" altLang="zh-CN" i="0" dirty="0">
-                <a:effectLst/>
-                <a:latin typeface="Helvetica Neue" panose="02000503000000020004" pitchFamily="2" charset="0"/>
-              </a:rPr>
-              <a:t>AI </a:t>
-            </a:r>
-            <a:r>
-              <a:rPr lang="zh-CN" altLang="en-US" i="0" dirty="0">
-                <a:effectLst/>
-                <a:latin typeface="Helvetica Neue" panose="02000503000000020004" pitchFamily="2" charset="0"/>
-              </a:rPr>
-              <a:t>软硬件平台，构筑智能世界的基石</a:t>
+              <a:rPr lang="en-US" altLang="zh-CN" dirty="0"/>
+              <a:t>Cube</a:t>
+            </a:r>
+            <a:r>
+              <a:rPr lang="zh-CN" altLang="en-US" dirty="0"/>
+              <a:t> </a:t>
+            </a:r>
+            <a:r>
+              <a:rPr lang="en-US" altLang="zh-CN" dirty="0"/>
+              <a:t> Core</a:t>
+            </a:r>
+            <a:r>
+              <a:rPr lang="zh-CN" altLang="en-US" dirty="0"/>
+              <a:t> 计算 </a:t>
+            </a:r>
+            <a:r>
+              <a:rPr lang="en-US" altLang="zh-CN" dirty="0"/>
+              <a:t>MAC</a:t>
+            </a:r>
+            <a:r>
+              <a:rPr lang="zh-CN" altLang="en-US" dirty="0"/>
+              <a:t> </a:t>
+            </a:r>
+            <a:r>
+              <a:rPr lang="en-US" altLang="zh-CN" dirty="0"/>
+              <a:t>16^3</a:t>
             </a:r>
             <a:endParaRPr lang="zh-CN" altLang="en-US" dirty="0"/>
           </a:p>
@@ -25861,10 +27153,10 @@
       </p:sp>
       <p:sp>
         <p:nvSpPr>
-          <p:cNvPr id="2" name="内容占位符 1">
+          <p:cNvPr id="5" name="内容占位符 4">
             <a:extLst>
               <a:ext uri="{FF2B5EF4-FFF2-40B4-BE49-F238E27FC236}">
-                <a16:creationId xmlns:a16="http://schemas.microsoft.com/office/drawing/2014/main" id="{9EEF7910-AB1A-24EA-D7AA-22FED796C016}"/>
+                <a16:creationId xmlns:a16="http://schemas.microsoft.com/office/drawing/2014/main" id="{2DD53E27-1D8F-DFCB-9B2F-227287D72AD4}"/>
               </a:ext>
             </a:extLst>
           </p:cNvPr>
@@ -25875,19 +27167,188 @@
             <p:ph sz="half" idx="1"/>
           </p:nvPr>
         </p:nvSpPr>
-        <p:spPr/>
+        <p:spPr>
+          <a:xfrm>
+            <a:off x="510621" y="1304818"/>
+            <a:ext cx="11119727" cy="5050262"/>
+          </a:xfrm>
+        </p:spPr>
         <p:txBody>
           <a:bodyPr/>
           <a:lstStyle/>
           <a:p>
-            <a:endParaRPr lang="zh-CN" altLang="en-US"/>
+            <a:r>
+              <a:rPr lang="en-US" altLang="zh-CN" sz="1900" dirty="0"/>
+              <a:t>Cube</a:t>
+            </a:r>
+            <a:r>
+              <a:rPr lang="zh-CN" altLang="en-US" sz="1900" dirty="0"/>
+              <a:t> </a:t>
+            </a:r>
+            <a:r>
+              <a:rPr lang="en-US" altLang="zh-CN" sz="1900" dirty="0"/>
+              <a:t>Core</a:t>
+            </a:r>
+            <a:r>
+              <a:rPr lang="zh-CN" altLang="en-US" sz="1900" dirty="0"/>
+              <a:t> 一条指令完成两个 </a:t>
+            </a:r>
+            <a:r>
+              <a:rPr lang="en-US" altLang="zh-CN" sz="1900" dirty="0"/>
+              <a:t>16x16 </a:t>
+            </a:r>
+            <a:r>
+              <a:rPr lang="zh-CN" altLang="en-US" sz="1900" dirty="0"/>
+              <a:t>矩阵 </a:t>
+            </a:r>
+            <a:r>
+              <a:rPr lang="en-US" altLang="zh-CN" sz="1900" dirty="0"/>
+              <a:t>MAC</a:t>
+            </a:r>
+            <a:r>
+              <a:rPr lang="zh-CN" altLang="en-US" sz="1900" dirty="0"/>
+              <a:t>，等于一个时钟周期进行 </a:t>
+            </a:r>
+            <a:r>
+              <a:rPr lang="en-US" altLang="zh-CN" sz="1900" dirty="0"/>
+              <a:t>16^3=4096 </a:t>
+            </a:r>
+            <a:r>
+              <a:rPr lang="zh-CN" altLang="en-US" sz="1900" dirty="0"/>
+              <a:t>个 </a:t>
+            </a:r>
+            <a:r>
+              <a:rPr lang="en-US" altLang="zh-CN" sz="1900" dirty="0"/>
+              <a:t>MAC</a:t>
+            </a:r>
+            <a:r>
+              <a:rPr lang="zh-CN" altLang="en-US" sz="1900" dirty="0"/>
+              <a:t> 计算；执行前将 </a:t>
+            </a:r>
+            <a:r>
+              <a:rPr lang="en" altLang="zh-CN" sz="1900" dirty="0"/>
+              <a:t>A</a:t>
+            </a:r>
+            <a:r>
+              <a:rPr lang="zh-CN" altLang="en-US" sz="1900" dirty="0"/>
+              <a:t> 按行 </a:t>
+            </a:r>
+            <a:r>
+              <a:rPr lang="en-US" altLang="zh-CN" sz="1900" dirty="0"/>
+              <a:t>&amp;</a:t>
+            </a:r>
+            <a:r>
+              <a:rPr lang="zh-CN" altLang="en-US" sz="1900" dirty="0"/>
+              <a:t> </a:t>
+            </a:r>
+            <a:r>
+              <a:rPr lang="en" altLang="zh-CN" sz="1900" dirty="0"/>
+              <a:t>B </a:t>
+            </a:r>
+            <a:r>
+              <a:rPr lang="zh-CN" altLang="en-US" sz="1900" dirty="0"/>
+              <a:t>按列存放在 </a:t>
+            </a:r>
+            <a:r>
+              <a:rPr lang="en-US" altLang="zh-CN" sz="1900" dirty="0"/>
+              <a:t>Input</a:t>
+            </a:r>
+            <a:r>
+              <a:rPr lang="zh-CN" altLang="en-US" sz="1900" dirty="0"/>
+              <a:t> </a:t>
+            </a:r>
+            <a:r>
+              <a:rPr lang="en-US" altLang="zh-CN" sz="1900" dirty="0"/>
+              <a:t>buffer</a:t>
+            </a:r>
+            <a:r>
+              <a:rPr lang="zh-CN" altLang="en-US" sz="1900" dirty="0"/>
+              <a:t>，通过 </a:t>
+            </a:r>
+            <a:r>
+              <a:rPr lang="en-US" altLang="zh-CN" sz="1900" dirty="0"/>
+              <a:t>Cube</a:t>
+            </a:r>
+            <a:r>
+              <a:rPr lang="zh-CN" altLang="en-US" sz="1900" dirty="0"/>
+              <a:t> </a:t>
+            </a:r>
+            <a:r>
+              <a:rPr lang="en-US" altLang="zh-CN" sz="1900" dirty="0"/>
+              <a:t>Core</a:t>
+            </a:r>
+            <a:r>
+              <a:rPr lang="zh-CN" altLang="en-US" sz="1900" dirty="0"/>
+              <a:t> 计算得到  </a:t>
+            </a:r>
+            <a:r>
+              <a:rPr lang="en" altLang="zh-CN" sz="1900" dirty="0"/>
+              <a:t>C</a:t>
+            </a:r>
+            <a:r>
+              <a:rPr lang="zh-CN" altLang="en-US" sz="1900" dirty="0"/>
+              <a:t> 按行存放在 </a:t>
+            </a:r>
+            <a:r>
+              <a:rPr lang="en-US" altLang="zh-CN" sz="1900" dirty="0"/>
+              <a:t>Output</a:t>
+            </a:r>
+            <a:r>
+              <a:rPr lang="zh-CN" altLang="en-US" sz="1900" dirty="0"/>
+              <a:t> </a:t>
+            </a:r>
+            <a:r>
+              <a:rPr lang="en-US" altLang="zh-CN" sz="1900" dirty="0"/>
+              <a:t>Buffer</a:t>
+            </a:r>
+            <a:r>
+              <a:rPr lang="zh-CN" altLang="en-US" sz="1900" dirty="0"/>
+              <a:t>。</a:t>
+            </a:r>
           </a:p>
         </p:txBody>
       </p:sp>
+      <p:pic>
+        <p:nvPicPr>
+          <p:cNvPr id="7" name="内容占位符 4">
+            <a:extLst>
+              <a:ext uri="{FF2B5EF4-FFF2-40B4-BE49-F238E27FC236}">
+                <a16:creationId xmlns:a16="http://schemas.microsoft.com/office/drawing/2014/main" id="{0E8D1852-6A18-D1D0-75BD-C5A45F10DD48}"/>
+              </a:ext>
+            </a:extLst>
+          </p:cNvPr>
+          <p:cNvPicPr>
+            <a:picLocks noChangeAspect="1"/>
+          </p:cNvPicPr>
+          <p:nvPr/>
+        </p:nvPicPr>
+        <p:blipFill>
+          <a:blip r:embed="rId2">
+            <a:extLst>
+              <a:ext uri="{28A0092B-C50C-407E-A947-70E740481C1C}">
+                <a14:useLocalDpi xmlns:a14="http://schemas.microsoft.com/office/drawing/2010/main" val="0"/>
+              </a:ext>
+            </a:extLst>
+          </a:blip>
+          <a:stretch>
+            <a:fillRect/>
+          </a:stretch>
+        </p:blipFill>
+        <p:spPr>
+          <a:xfrm>
+            <a:off x="823671" y="2477334"/>
+            <a:ext cx="9871324" cy="3678413"/>
+          </a:xfrm>
+          <a:prstGeom prst="rect">
+            <a:avLst/>
+          </a:prstGeom>
+          <a:noFill/>
+        </p:spPr>
+      </p:pic>
     </p:spTree>
     <p:extLst>
       <p:ext uri="{BB962C8B-B14F-4D97-AF65-F5344CB8AC3E}">
-        <p14:creationId xmlns:p14="http://schemas.microsoft.com/office/powerpoint/2010/main" val="3837425777"/>
+        <p14:creationId xmlns:p14="http://schemas.microsoft.com/office/powerpoint/2010/main" val="2928028669"/>
       </p:ext>
     </p:extLst>
   </p:cSld>
@@ -25928,10 +27389,10 @@
       </p:grpSpPr>
       <p:sp>
         <p:nvSpPr>
-          <p:cNvPr id="2" name="内容占位符 1">
+          <p:cNvPr id="2" name="标题 1">
             <a:extLst>
               <a:ext uri="{FF2B5EF4-FFF2-40B4-BE49-F238E27FC236}">
-                <a16:creationId xmlns:a16="http://schemas.microsoft.com/office/drawing/2014/main" id="{9A886A44-E4B7-BAD6-B0F6-B2C995C4750A}"/>
+                <a16:creationId xmlns:a16="http://schemas.microsoft.com/office/drawing/2014/main" id="{405104B5-679C-E449-06EC-3E31160005CC}"/>
               </a:ext>
             </a:extLst>
           </p:cNvPr>
@@ -25939,23 +27400,423 @@
             <a:spLocks noGrp="1"/>
           </p:cNvSpPr>
           <p:nvPr>
-            <p:ph sz="half" idx="1"/>
+            <p:ph type="title"/>
           </p:nvPr>
         </p:nvSpPr>
         <p:spPr/>
         <p:txBody>
-          <a:bodyPr>
-            <a:normAutofit/>
-          </a:bodyPr>
+          <a:bodyPr/>
           <a:lstStyle/>
           <a:p>
             <a:r>
-              <a:rPr kumimoji="1" lang="en-US" altLang="zh-CN" dirty="0"/>
-              <a:t>04</a:t>
-            </a:r>
-            <a:r>
-              <a:rPr kumimoji="1" lang="zh-CN" altLang="en-US" dirty="0"/>
-              <a:t> 小结与思考</a:t>
+              <a:rPr lang="en-US" altLang="zh-CN" dirty="0"/>
+              <a:t>Cube</a:t>
+            </a:r>
+            <a:r>
+              <a:rPr lang="zh-CN" altLang="en-US" dirty="0"/>
+              <a:t> </a:t>
+            </a:r>
+            <a:r>
+              <a:rPr lang="en-US" altLang="zh-CN" dirty="0"/>
+              <a:t> Core</a:t>
+            </a:r>
+            <a:r>
+              <a:rPr lang="zh-CN" altLang="en-US" dirty="0"/>
+              <a:t> 计算 </a:t>
+            </a:r>
+            <a:r>
+              <a:rPr lang="en-US" altLang="zh-CN" dirty="0"/>
+              <a:t>MAC</a:t>
+            </a:r>
+            <a:r>
+              <a:rPr lang="zh-CN" altLang="en-US" dirty="0"/>
+              <a:t> </a:t>
+            </a:r>
+            <a:r>
+              <a:rPr lang="en-US" altLang="zh-CN" dirty="0"/>
+              <a:t>16^3</a:t>
+            </a:r>
+            <a:endParaRPr lang="zh-CN" altLang="en-US" dirty="0"/>
+          </a:p>
+        </p:txBody>
+      </p:sp>
+      <p:pic>
+        <p:nvPicPr>
+          <p:cNvPr id="7" name="内容占位符 6">
+            <a:extLst>
+              <a:ext uri="{FF2B5EF4-FFF2-40B4-BE49-F238E27FC236}">
+                <a16:creationId xmlns:a16="http://schemas.microsoft.com/office/drawing/2014/main" id="{A46C8374-B5F5-AB90-B976-13937BC038FE}"/>
+              </a:ext>
+            </a:extLst>
+          </p:cNvPr>
+          <p:cNvPicPr>
+            <a:picLocks noGrp="1" noChangeAspect="1"/>
+          </p:cNvPicPr>
+          <p:nvPr>
+            <p:ph sz="half" idx="1"/>
+          </p:nvPr>
+        </p:nvPicPr>
+        <p:blipFill>
+          <a:blip r:embed="rId2">
+            <a:extLst>
+              <a:ext uri="{28A0092B-C50C-407E-A947-70E740481C1C}">
+                <a14:useLocalDpi xmlns:a14="http://schemas.microsoft.com/office/drawing/2010/main" val="0"/>
+              </a:ext>
+            </a:extLst>
+          </a:blip>
+          <a:stretch>
+            <a:fillRect/>
+          </a:stretch>
+        </p:blipFill>
+        <p:spPr>
+          <a:xfrm>
+            <a:off x="469525" y="1194323"/>
+            <a:ext cx="8664203" cy="5136085"/>
+          </a:xfrm>
+        </p:spPr>
+      </p:pic>
+      <p:sp>
+        <p:nvSpPr>
+          <p:cNvPr id="3" name="内容占位符 4">
+            <a:extLst>
+              <a:ext uri="{FF2B5EF4-FFF2-40B4-BE49-F238E27FC236}">
+                <a16:creationId xmlns:a16="http://schemas.microsoft.com/office/drawing/2014/main" id="{8620F08E-69B2-776B-2D67-186F0825CC37}"/>
+              </a:ext>
+            </a:extLst>
+          </p:cNvPr>
+          <p:cNvSpPr txBox="1">
+            <a:spLocks/>
+          </p:cNvSpPr>
+          <p:nvPr/>
+        </p:nvSpPr>
+        <p:spPr>
+          <a:xfrm>
+            <a:off x="6098381" y="1360170"/>
+            <a:ext cx="5757997" cy="4994910"/>
+          </a:xfrm>
+          <a:prstGeom prst="rect">
+            <a:avLst/>
+          </a:prstGeom>
+          <a:noFill/>
+        </p:spPr>
+        <p:txBody>
+          <a:bodyPr/>
+          <a:lstStyle>
+            <a:lvl1pPr marL="239106" marR="0" indent="-239106" algn="l" defTabSz="1218804" rtl="0" eaLnBrk="1" fontAlgn="base" latinLnBrk="1" hangingPunct="1">
+              <a:lnSpc>
+                <a:spcPct val="150000"/>
+              </a:lnSpc>
+              <a:spcBef>
+                <a:spcPts val="0"/>
+              </a:spcBef>
+              <a:spcAft>
+                <a:spcPts val="800"/>
+              </a:spcAft>
+              <a:buClr>
+                <a:srgbClr val="92D050"/>
+              </a:buClr>
+              <a:buFont typeface="Arial" pitchFamily="34" charset="0"/>
+              <a:buChar char="•"/>
+              <a:tabLst/>
+              <a:defRPr kumimoji="0" lang="zh-CN" altLang="en-US" sz="2000" b="0" i="0" u="none" strike="noStrike" kern="0" cap="none" spc="0" normalizeH="0" baseline="0" dirty="0">
+                <a:ln>
+                  <a:noFill/>
+                </a:ln>
+                <a:solidFill>
+                  <a:srgbClr val="374154"/>
+                </a:solidFill>
+                <a:effectLst/>
+                <a:uLnTx/>
+                <a:uFillTx/>
+                <a:latin typeface="Gill Sans MT" panose="020B0502020104020203" pitchFamily="34" charset="0"/>
+                <a:ea typeface="微软雅黑" pitchFamily="34" charset="-122"/>
+                <a:cs typeface="+mn-cs"/>
+              </a:defRPr>
+            </a:lvl1pPr>
+            <a:lvl2pPr marL="476096" marR="0" indent="-236990" algn="l" defTabSz="1218804" rtl="0" eaLnBrk="1" fontAlgn="base" latinLnBrk="1" hangingPunct="1">
+              <a:lnSpc>
+                <a:spcPct val="150000"/>
+              </a:lnSpc>
+              <a:spcBef>
+                <a:spcPts val="0"/>
+              </a:spcBef>
+              <a:spcAft>
+                <a:spcPts val="800"/>
+              </a:spcAft>
+              <a:buClr>
+                <a:srgbClr val="92D050"/>
+              </a:buClr>
+              <a:buFont typeface="Arial" panose="020B0604020202020204" pitchFamily="34" charset="0"/>
+              <a:buChar char="◦"/>
+              <a:tabLst/>
+              <a:defRPr kumimoji="0" lang="zh-CN" altLang="en-US" sz="1800" b="0" i="0" u="none" strike="noStrike" kern="0" cap="none" spc="0" normalizeH="0" baseline="0" dirty="0">
+                <a:ln>
+                  <a:noFill/>
+                </a:ln>
+                <a:solidFill>
+                  <a:srgbClr val="374154"/>
+                </a:solidFill>
+                <a:effectLst/>
+                <a:uLnTx/>
+                <a:uFillTx/>
+                <a:latin typeface="Gill Sans MT" panose="020B0502020104020203" pitchFamily="34" charset="0"/>
+                <a:ea typeface="微软雅黑" pitchFamily="34" charset="-122"/>
+                <a:cs typeface="+mn-cs"/>
+              </a:defRPr>
+            </a:lvl2pPr>
+            <a:lvl3pPr marL="833696" marR="0" indent="-236990" algn="l" defTabSz="1218804" rtl="0" eaLnBrk="1" fontAlgn="base" latinLnBrk="1" hangingPunct="1">
+              <a:lnSpc>
+                <a:spcPct val="150000"/>
+              </a:lnSpc>
+              <a:spcBef>
+                <a:spcPts val="0"/>
+              </a:spcBef>
+              <a:spcAft>
+                <a:spcPts val="800"/>
+              </a:spcAft>
+              <a:buClr>
+                <a:srgbClr val="92D050"/>
+              </a:buClr>
+              <a:buFontTx/>
+              <a:buChar char="-"/>
+              <a:tabLst/>
+              <a:defRPr kumimoji="0" lang="zh-CN" altLang="en-US" sz="1600" b="0" i="0" u="none" strike="noStrike" kern="0" cap="none" spc="0" normalizeH="0" baseline="0" dirty="0">
+                <a:ln>
+                  <a:noFill/>
+                </a:ln>
+                <a:solidFill>
+                  <a:srgbClr val="374154"/>
+                </a:solidFill>
+                <a:effectLst/>
+                <a:uLnTx/>
+                <a:uFillTx/>
+                <a:latin typeface="Gill Sans MT" panose="020B0502020104020203" pitchFamily="34" charset="0"/>
+                <a:ea typeface="微软雅黑" pitchFamily="34" charset="-122"/>
+                <a:cs typeface="+mn-cs"/>
+              </a:defRPr>
+            </a:lvl3pPr>
+            <a:lvl4pPr marL="2133600" indent="-304800" algn="l" defTabSz="1219200" rtl="0" eaLnBrk="1" latinLnBrk="0" hangingPunct="1">
+              <a:spcBef>
+                <a:spcPct val="20000"/>
+              </a:spcBef>
+              <a:buFont typeface="Arial" pitchFamily="34" charset="0"/>
+              <a:buChar char="–"/>
+              <a:defRPr sz="1542" kern="1200">
+                <a:solidFill>
+                  <a:schemeClr val="tx1"/>
+                </a:solidFill>
+                <a:latin typeface="+mn-lt"/>
+                <a:ea typeface="+mn-ea"/>
+                <a:cs typeface="+mn-cs"/>
+              </a:defRPr>
+            </a:lvl4pPr>
+            <a:lvl5pPr marL="2743200" indent="-304800" algn="l" defTabSz="1219200" rtl="0" eaLnBrk="1" latinLnBrk="0" hangingPunct="1">
+              <a:spcBef>
+                <a:spcPct val="20000"/>
+              </a:spcBef>
+              <a:buFont typeface="Arial" pitchFamily="34" charset="0"/>
+              <a:buChar char="»"/>
+              <a:defRPr sz="1542" kern="1200">
+                <a:solidFill>
+                  <a:schemeClr val="tx1"/>
+                </a:solidFill>
+                <a:latin typeface="+mn-lt"/>
+                <a:ea typeface="+mn-ea"/>
+                <a:cs typeface="+mn-cs"/>
+              </a:defRPr>
+            </a:lvl5pPr>
+            <a:lvl6pPr marL="3352800" indent="-304800" algn="l" defTabSz="1219200" rtl="0" eaLnBrk="1" latinLnBrk="0" hangingPunct="1">
+              <a:spcBef>
+                <a:spcPct val="20000"/>
+              </a:spcBef>
+              <a:buFont typeface="Arial" pitchFamily="34" charset="0"/>
+              <a:buChar char="•"/>
+              <a:defRPr sz="1542" kern="1200">
+                <a:solidFill>
+                  <a:schemeClr val="tx1"/>
+                </a:solidFill>
+                <a:latin typeface="+mn-lt"/>
+                <a:ea typeface="+mn-ea"/>
+                <a:cs typeface="+mn-cs"/>
+              </a:defRPr>
+            </a:lvl6pPr>
+            <a:lvl7pPr marL="3962399" indent="-304800" algn="l" defTabSz="1219200" rtl="0" eaLnBrk="1" latinLnBrk="0" hangingPunct="1">
+              <a:spcBef>
+                <a:spcPct val="20000"/>
+              </a:spcBef>
+              <a:buFont typeface="Arial" pitchFamily="34" charset="0"/>
+              <a:buChar char="•"/>
+              <a:defRPr sz="1542" kern="1200">
+                <a:solidFill>
+                  <a:schemeClr val="tx1"/>
+                </a:solidFill>
+                <a:latin typeface="+mn-lt"/>
+                <a:ea typeface="+mn-ea"/>
+                <a:cs typeface="+mn-cs"/>
+              </a:defRPr>
+            </a:lvl7pPr>
+            <a:lvl8pPr marL="4571999" indent="-304800" algn="l" defTabSz="1219200" rtl="0" eaLnBrk="1" latinLnBrk="0" hangingPunct="1">
+              <a:spcBef>
+                <a:spcPct val="20000"/>
+              </a:spcBef>
+              <a:buFont typeface="Arial" pitchFamily="34" charset="0"/>
+              <a:buChar char="•"/>
+              <a:defRPr sz="1542" kern="1200">
+                <a:solidFill>
+                  <a:schemeClr val="tx1"/>
+                </a:solidFill>
+                <a:latin typeface="+mn-lt"/>
+                <a:ea typeface="+mn-ea"/>
+                <a:cs typeface="+mn-cs"/>
+              </a:defRPr>
+            </a:lvl8pPr>
+            <a:lvl9pPr marL="5181599" indent="-304800" algn="l" defTabSz="1219200" rtl="0" eaLnBrk="1" latinLnBrk="0" hangingPunct="1">
+              <a:spcBef>
+                <a:spcPct val="20000"/>
+              </a:spcBef>
+              <a:buFont typeface="Arial" pitchFamily="34" charset="0"/>
+              <a:buChar char="•"/>
+              <a:defRPr sz="1542" kern="1200">
+                <a:solidFill>
+                  <a:schemeClr val="tx1"/>
+                </a:solidFill>
+                <a:latin typeface="+mn-lt"/>
+                <a:ea typeface="+mn-ea"/>
+                <a:cs typeface="+mn-cs"/>
+              </a:defRPr>
+            </a:lvl9pPr>
+          </a:lstStyle>
+          <a:p>
+            <a:r>
+              <a:rPr lang="en" altLang="zh-CN" sz="1600" dirty="0"/>
+              <a:t>C</a:t>
+            </a:r>
+            <a:r>
+              <a:rPr lang="zh-CN" altLang="en-US" sz="1600" dirty="0"/>
+              <a:t> 第一元素由 </a:t>
+            </a:r>
+            <a:r>
+              <a:rPr lang="en" altLang="zh-CN" sz="1600" dirty="0"/>
+              <a:t>A </a:t>
+            </a:r>
+            <a:r>
+              <a:rPr lang="zh-CN" altLang="en-US" sz="1600" dirty="0"/>
+              <a:t>第一行 </a:t>
+            </a:r>
+            <a:r>
+              <a:rPr lang="en-US" altLang="zh-CN" sz="1600" dirty="0"/>
+              <a:t>16 </a:t>
+            </a:r>
+            <a:r>
+              <a:rPr lang="zh-CN" altLang="en-US" sz="1600" dirty="0"/>
+              <a:t>个元素 </a:t>
+            </a:r>
+            <a:r>
+              <a:rPr lang="en-US" altLang="zh-CN" sz="1600" dirty="0"/>
+              <a:t>&amp;</a:t>
+            </a:r>
+            <a:r>
+              <a:rPr lang="zh-CN" altLang="en-US" sz="1600" dirty="0"/>
+              <a:t> </a:t>
+            </a:r>
+            <a:r>
+              <a:rPr lang="en" altLang="zh-CN" sz="1600" dirty="0"/>
+              <a:t>B</a:t>
+            </a:r>
+            <a:r>
+              <a:rPr lang="zh-CN" altLang="en-US" sz="1600" dirty="0"/>
+              <a:t> 第一列 </a:t>
+            </a:r>
+            <a:r>
+              <a:rPr lang="en-US" altLang="zh-CN" sz="1600" dirty="0"/>
+              <a:t>16 </a:t>
+            </a:r>
+            <a:r>
+              <a:rPr lang="zh-CN" altLang="en-US" sz="1600" dirty="0"/>
+              <a:t>个元素通过 </a:t>
+            </a:r>
+            <a:r>
+              <a:rPr lang="en-US" altLang="zh-CN" sz="1600" dirty="0"/>
+              <a:t>Cube</a:t>
+            </a:r>
+            <a:r>
+              <a:rPr lang="zh-CN" altLang="en-US" sz="1600" dirty="0"/>
+              <a:t> </a:t>
+            </a:r>
+            <a:r>
+              <a:rPr lang="en-US" altLang="zh-CN" sz="1600" dirty="0"/>
+              <a:t>Core</a:t>
+            </a:r>
+            <a:r>
+              <a:rPr lang="zh-CN" altLang="en-US" sz="1600" dirty="0"/>
+              <a:t> 电路进行 </a:t>
+            </a:r>
+            <a:r>
+              <a:rPr lang="en-US" altLang="zh-CN" sz="1600" dirty="0"/>
+              <a:t>16 </a:t>
+            </a:r>
+            <a:r>
+              <a:rPr lang="zh-CN" altLang="en-US" sz="1600" dirty="0"/>
+              <a:t>次乘法 </a:t>
+            </a:r>
+            <a:r>
+              <a:rPr lang="en-US" altLang="zh-CN" sz="1600" dirty="0"/>
+              <a:t>&amp;</a:t>
+            </a:r>
+            <a:r>
+              <a:rPr lang="zh-CN" altLang="en-US" sz="1600" dirty="0"/>
+              <a:t> </a:t>
+            </a:r>
+            <a:r>
+              <a:rPr lang="en-US" altLang="zh-CN" sz="1600" dirty="0"/>
+              <a:t>15 </a:t>
+            </a:r>
+            <a:r>
+              <a:rPr lang="zh-CN" altLang="en-US" sz="1600" dirty="0"/>
+              <a:t>次加法计算得到。</a:t>
+            </a:r>
+            <a:endParaRPr lang="en-US" altLang="zh-CN" sz="1600" dirty="0"/>
+          </a:p>
+          <a:p>
+            <a:r>
+              <a:rPr lang="en-US" altLang="zh-CN" sz="1600" dirty="0"/>
+              <a:t>Cube</a:t>
+            </a:r>
+            <a:r>
+              <a:rPr lang="zh-CN" altLang="en-US" sz="1600" dirty="0"/>
+              <a:t> </a:t>
+            </a:r>
+            <a:r>
+              <a:rPr lang="en-US" altLang="zh-CN" sz="1600" dirty="0"/>
+              <a:t>Core</a:t>
+            </a:r>
+            <a:r>
+              <a:rPr lang="zh-CN" altLang="en-US" sz="1600" dirty="0"/>
+              <a:t> 共有 </a:t>
+            </a:r>
+            <a:r>
+              <a:rPr lang="en-US" altLang="zh-CN" sz="1600" dirty="0"/>
+              <a:t>256 </a:t>
+            </a:r>
+            <a:r>
+              <a:rPr lang="zh-CN" altLang="en-US" sz="1600" dirty="0"/>
+              <a:t>个矩阵计算子电路组成，一条指令并行完成矩阵 </a:t>
+            </a:r>
+            <a:r>
+              <a:rPr lang="en" altLang="zh-CN" sz="1600" dirty="0"/>
+              <a:t>C</a:t>
+            </a:r>
+            <a:r>
+              <a:rPr lang="zh-CN" altLang="en-US" sz="1600" dirty="0"/>
+              <a:t> </a:t>
+            </a:r>
+            <a:r>
+              <a:rPr lang="en-US" altLang="zh-CN" sz="1600" dirty="0"/>
+              <a:t>256 </a:t>
+            </a:r>
+            <a:r>
+              <a:rPr lang="zh-CN" altLang="en-US" sz="1600" dirty="0"/>
+              <a:t>个元素计算。</a:t>
             </a:r>
           </a:p>
         </p:txBody>
@@ -25963,7 +27824,7 @@
     </p:spTree>
     <p:extLst>
       <p:ext uri="{BB962C8B-B14F-4D97-AF65-F5344CB8AC3E}">
-        <p14:creationId xmlns:p14="http://schemas.microsoft.com/office/powerpoint/2010/main" val="2256116713"/>
+        <p14:creationId xmlns:p14="http://schemas.microsoft.com/office/powerpoint/2010/main" val="4029986628"/>
       </p:ext>
     </p:extLst>
   </p:cSld>
@@ -26301,6 +28162,510 @@
       </p:grpSpPr>
       <p:sp>
         <p:nvSpPr>
+          <p:cNvPr id="3" name="内容占位符 2">
+            <a:extLst>
+              <a:ext uri="{FF2B5EF4-FFF2-40B4-BE49-F238E27FC236}">
+                <a16:creationId xmlns:a16="http://schemas.microsoft.com/office/drawing/2014/main" id="{C44BF354-F918-5092-0390-D18823D3F74F}"/>
+              </a:ext>
+            </a:extLst>
+          </p:cNvPr>
+          <p:cNvSpPr>
+            <a:spLocks noGrp="1"/>
+          </p:cNvSpPr>
+          <p:nvPr>
+            <p:ph sz="half" idx="1"/>
+          </p:nvPr>
+        </p:nvSpPr>
+        <p:spPr/>
+        <p:txBody>
+          <a:bodyPr/>
+          <a:lstStyle/>
+          <a:p>
+            <a:r>
+              <a:rPr lang="en-US" altLang="zh-CN" dirty="0">
+                <a:latin typeface="Futura Medium" panose="020B0602020204020303" pitchFamily="34" charset="-79"/>
+                <a:cs typeface="Futura Medium" panose="020B0602020204020303" pitchFamily="34" charset="-79"/>
+              </a:rPr>
+              <a:t>Vector</a:t>
+            </a:r>
+            <a:r>
+              <a:rPr lang="zh-CN" altLang="en-US" dirty="0">
+                <a:latin typeface="Futura Medium" panose="020B0602020204020303" pitchFamily="34" charset="-79"/>
+                <a:cs typeface="Futura Medium" panose="020B0602020204020303" pitchFamily="34" charset="-79"/>
+              </a:rPr>
+              <a:t> </a:t>
+            </a:r>
+            <a:r>
+              <a:rPr lang="en-US" altLang="zh-CN" dirty="0">
+                <a:latin typeface="Futura Medium" panose="020B0602020204020303" pitchFamily="34" charset="-79"/>
+                <a:cs typeface="Futura Medium" panose="020B0602020204020303" pitchFamily="34" charset="-79"/>
+              </a:rPr>
+              <a:t>Core</a:t>
+            </a:r>
+            <a:endParaRPr lang="zh-CN" altLang="en-US" dirty="0">
+              <a:latin typeface="Futura Medium" panose="020B0602020204020303" pitchFamily="34" charset="-79"/>
+              <a:cs typeface="Futura Medium" panose="020B0602020204020303" pitchFamily="34" charset="-79"/>
+            </a:endParaRPr>
+          </a:p>
+        </p:txBody>
+      </p:sp>
+    </p:spTree>
+    <p:extLst>
+      <p:ext uri="{BB962C8B-B14F-4D97-AF65-F5344CB8AC3E}">
+        <p14:creationId xmlns:p14="http://schemas.microsoft.com/office/powerpoint/2010/main" val="3760443327"/>
+      </p:ext>
+    </p:extLst>
+  </p:cSld>
+  <p:clrMapOvr>
+    <a:masterClrMapping/>
+  </p:clrMapOvr>
+  <mc:AlternateContent xmlns:mc="http://schemas.openxmlformats.org/markup-compatibility/2006" xmlns:p159="http://schemas.microsoft.com/office/powerpoint/2015/09/main">
+    <mc:Choice Requires="p159">
+      <p:transition xmlns:p14="http://schemas.microsoft.com/office/powerpoint/2010/main" spd="slow" p14:dur="2000">
+        <p159:morph option="byObject"/>
+      </p:transition>
+    </mc:Choice>
+    <mc:Fallback xmlns="">
+      <p:transition spd="slow">
+        <p:fade/>
+      </p:transition>
+    </mc:Fallback>
+  </mc:AlternateContent>
+</p:sld>
+</file>
+
+<file path=ppt/slides/slide21.xml><?xml version="1.0" encoding="utf-8"?>
+<p:sld xmlns:a="http://schemas.openxmlformats.org/drawingml/2006/main" xmlns:r="http://schemas.openxmlformats.org/officeDocument/2006/relationships" xmlns:p="http://schemas.openxmlformats.org/presentationml/2006/main">
+  <p:cSld>
+    <p:spTree>
+      <p:nvGrpSpPr>
+        <p:cNvPr id="1" name=""/>
+        <p:cNvGrpSpPr/>
+        <p:nvPr/>
+      </p:nvGrpSpPr>
+      <p:grpSpPr>
+        <a:xfrm>
+          <a:off x="0" y="0"/>
+          <a:ext cx="0" cy="0"/>
+          <a:chOff x="0" y="0"/>
+          <a:chExt cx="0" cy="0"/>
+        </a:xfrm>
+      </p:grpSpPr>
+      <p:sp>
+        <p:nvSpPr>
+          <p:cNvPr id="4" name="标题 3">
+            <a:extLst>
+              <a:ext uri="{FF2B5EF4-FFF2-40B4-BE49-F238E27FC236}">
+                <a16:creationId xmlns:a16="http://schemas.microsoft.com/office/drawing/2014/main" id="{3FD4C806-CB02-5AC4-4CBB-B4AF326DF034}"/>
+              </a:ext>
+            </a:extLst>
+          </p:cNvPr>
+          <p:cNvSpPr>
+            <a:spLocks noGrp="1"/>
+          </p:cNvSpPr>
+          <p:nvPr>
+            <p:ph type="title"/>
+          </p:nvPr>
+        </p:nvSpPr>
+        <p:spPr>
+          <a:xfrm>
+            <a:off x="623635" y="558414"/>
+            <a:ext cx="10963473" cy="589190"/>
+          </a:xfrm>
+        </p:spPr>
+        <p:txBody>
+          <a:bodyPr/>
+          <a:lstStyle/>
+          <a:p>
+            <a:r>
+              <a:rPr lang="en-US" altLang="zh-CN" dirty="0"/>
+              <a:t>AI Core</a:t>
+            </a:r>
+            <a:r>
+              <a:rPr lang="zh-CN" altLang="en-US" dirty="0"/>
+              <a:t>：计算单元 </a:t>
+            </a:r>
+            <a:r>
+              <a:rPr lang="en-US" altLang="zh-CN" dirty="0"/>
+              <a:t>Vector Unit</a:t>
+            </a:r>
+          </a:p>
+        </p:txBody>
+      </p:sp>
+      <p:sp>
+        <p:nvSpPr>
+          <p:cNvPr id="3" name="内容占位符 2">
+            <a:extLst>
+              <a:ext uri="{FF2B5EF4-FFF2-40B4-BE49-F238E27FC236}">
+                <a16:creationId xmlns:a16="http://schemas.microsoft.com/office/drawing/2014/main" id="{0D8A0164-EE35-BCC3-B7F8-8F02AAF64E8F}"/>
+              </a:ext>
+            </a:extLst>
+          </p:cNvPr>
+          <p:cNvSpPr>
+            <a:spLocks noGrp="1"/>
+          </p:cNvSpPr>
+          <p:nvPr>
+            <p:ph sz="half" idx="1"/>
+          </p:nvPr>
+        </p:nvSpPr>
+        <p:spPr>
+          <a:xfrm>
+            <a:off x="623888" y="1280478"/>
+            <a:ext cx="10963275" cy="4994275"/>
+          </a:xfrm>
+        </p:spPr>
+        <p:txBody>
+          <a:bodyPr anchor="t"/>
+          <a:lstStyle/>
+          <a:p>
+            <a:pPr>
+              <a:lnSpc>
+                <a:spcPct val="150000"/>
+              </a:lnSpc>
+            </a:pPr>
+            <a:r>
+              <a:rPr lang="en-US" altLang="zh-CN" dirty="0"/>
+              <a:t>Vector Unit</a:t>
+            </a:r>
+            <a:r>
+              <a:rPr lang="zh-CN" altLang="en-US" dirty="0"/>
+              <a:t> </a:t>
+            </a:r>
+            <a:r>
+              <a:rPr lang="zh-CN" altLang="zh-CN" dirty="0"/>
+              <a:t>主要负责完成和向量相关运算，能够实现向量</a:t>
+            </a:r>
+            <a:r>
+              <a:rPr lang="en-US" altLang="zh-CN" dirty="0"/>
+              <a:t>/</a:t>
+            </a:r>
+            <a:r>
+              <a:rPr lang="zh-CN" altLang="zh-CN" dirty="0"/>
+              <a:t>标量</a:t>
+            </a:r>
+            <a:r>
+              <a:rPr lang="en-US" altLang="zh-CN" dirty="0"/>
+              <a:t>/</a:t>
+            </a:r>
+            <a:r>
+              <a:rPr lang="zh-CN" altLang="zh-CN" dirty="0"/>
+              <a:t>双向量间计算，功能覆盖各种基本和多种定制计算类型，包括</a:t>
+            </a:r>
+            <a:r>
+              <a:rPr lang="en-US" altLang="zh-CN" dirty="0"/>
+              <a:t>FP32</a:t>
+            </a:r>
+            <a:r>
+              <a:rPr lang="zh-CN" altLang="zh-CN" dirty="0"/>
+              <a:t>、</a:t>
+            </a:r>
+            <a:r>
+              <a:rPr lang="en-US" altLang="zh-CN" dirty="0"/>
+              <a:t>FP16</a:t>
+            </a:r>
+            <a:r>
+              <a:rPr lang="zh-CN" altLang="zh-CN" dirty="0"/>
+              <a:t>、</a:t>
+            </a:r>
+            <a:r>
+              <a:rPr lang="en-US" altLang="zh-CN" dirty="0"/>
+              <a:t>INT32</a:t>
+            </a:r>
+            <a:r>
+              <a:rPr lang="zh-CN" altLang="zh-CN" dirty="0"/>
+              <a:t>和</a:t>
+            </a:r>
+            <a:r>
+              <a:rPr lang="en-US" altLang="zh-CN" dirty="0"/>
+              <a:t>INT8</a:t>
+            </a:r>
+            <a:r>
+              <a:rPr lang="zh-CN" altLang="zh-CN" dirty="0"/>
+              <a:t>等数据类型计算。</a:t>
+            </a:r>
+            <a:endParaRPr lang="en-US" altLang="zh-CN" dirty="0"/>
+          </a:p>
+          <a:p>
+            <a:pPr lvl="1"/>
+            <a:r>
+              <a:rPr lang="en-US" altLang="zh-CN" dirty="0"/>
+              <a:t>e.g.</a:t>
+            </a:r>
+            <a:r>
+              <a:rPr lang="zh-CN" altLang="en-US" dirty="0"/>
+              <a:t> </a:t>
+            </a:r>
+            <a:r>
+              <a:rPr lang="zh-CN" altLang="zh-CN" dirty="0"/>
+              <a:t>可快速完成两个</a:t>
+            </a:r>
+            <a:r>
+              <a:rPr lang="zh-CN" altLang="en-US" dirty="0"/>
+              <a:t> </a:t>
+            </a:r>
+            <a:r>
+              <a:rPr lang="en-US" altLang="zh-CN" dirty="0"/>
+              <a:t>FP16</a:t>
+            </a:r>
+            <a:r>
+              <a:rPr lang="zh-CN" altLang="en-US" dirty="0"/>
+              <a:t> </a:t>
+            </a:r>
+            <a:r>
+              <a:rPr lang="zh-CN" altLang="zh-CN" dirty="0"/>
+              <a:t>向量相加或者相乘。源操作数和目的操作数</a:t>
+            </a:r>
+            <a:r>
+              <a:rPr lang="zh-CN" altLang="en-US" dirty="0"/>
+              <a:t>，</a:t>
+            </a:r>
+            <a:r>
+              <a:rPr lang="zh-CN" altLang="zh-CN" dirty="0"/>
+              <a:t>通常保存在</a:t>
+            </a:r>
+            <a:r>
+              <a:rPr lang="en-US" altLang="zh-CN" dirty="0"/>
+              <a:t>output</a:t>
+            </a:r>
+            <a:r>
+              <a:rPr lang="zh-CN" altLang="en-US" dirty="0"/>
+              <a:t> </a:t>
+            </a:r>
+            <a:r>
+              <a:rPr lang="en-US" altLang="zh-CN" dirty="0"/>
+              <a:t>buffer</a:t>
+            </a:r>
+            <a:r>
+              <a:rPr lang="zh-CN" altLang="zh-CN" dirty="0"/>
+              <a:t>。</a:t>
+            </a:r>
+            <a:endParaRPr lang="en-US" altLang="zh-CN" dirty="0"/>
+          </a:p>
+          <a:p>
+            <a:pPr lvl="1"/>
+            <a:r>
+              <a:rPr lang="en-US" altLang="zh-CN" dirty="0"/>
+              <a:t>imp.</a:t>
+            </a:r>
+            <a:r>
+              <a:rPr lang="zh-CN" altLang="en-US" dirty="0"/>
+              <a:t> </a:t>
+            </a:r>
+            <a:r>
+              <a:rPr lang="zh-CN" altLang="zh-CN" dirty="0"/>
+              <a:t>对</a:t>
+            </a:r>
+            <a:r>
+              <a:rPr lang="en-US" altLang="zh-CN" dirty="0"/>
+              <a:t>Vector Unit</a:t>
+            </a:r>
+            <a:r>
+              <a:rPr lang="zh-CN" altLang="en-US" dirty="0"/>
+              <a:t> </a:t>
+            </a:r>
+            <a:r>
+              <a:rPr lang="zh-CN" altLang="zh-CN" dirty="0"/>
+              <a:t>输入数据可以不连续，这取决于输入数据寻址模式。</a:t>
+            </a:r>
+          </a:p>
+        </p:txBody>
+      </p:sp>
+      <p:pic>
+        <p:nvPicPr>
+          <p:cNvPr id="6" name="图片 5">
+            <a:extLst>
+              <a:ext uri="{FF2B5EF4-FFF2-40B4-BE49-F238E27FC236}">
+                <a16:creationId xmlns:a16="http://schemas.microsoft.com/office/drawing/2014/main" id="{221103CA-5077-016C-D97E-F3298106BF22}"/>
+              </a:ext>
+            </a:extLst>
+          </p:cNvPr>
+          <p:cNvPicPr>
+            <a:picLocks noChangeAspect="1"/>
+          </p:cNvPicPr>
+          <p:nvPr/>
+        </p:nvPicPr>
+        <p:blipFill>
+          <a:blip r:embed="rId2">
+            <a:extLst>
+              <a:ext uri="{28A0092B-C50C-407E-A947-70E740481C1C}">
+                <a14:useLocalDpi xmlns:a14="http://schemas.microsoft.com/office/drawing/2010/main" val="0"/>
+              </a:ext>
+            </a:extLst>
+          </a:blip>
+          <a:stretch>
+            <a:fillRect/>
+          </a:stretch>
+        </p:blipFill>
+        <p:spPr>
+          <a:xfrm>
+            <a:off x="1217460" y="3646556"/>
+            <a:ext cx="9409302" cy="2653030"/>
+          </a:xfrm>
+          <a:prstGeom prst="rect">
+            <a:avLst/>
+          </a:prstGeom>
+        </p:spPr>
+      </p:pic>
+      <p:cxnSp>
+        <p:nvCxnSpPr>
+          <p:cNvPr id="8" name="直线连接符 7">
+            <a:extLst>
+              <a:ext uri="{FF2B5EF4-FFF2-40B4-BE49-F238E27FC236}">
+                <a16:creationId xmlns:a16="http://schemas.microsoft.com/office/drawing/2014/main" id="{78CCA4C2-8508-0846-CA32-62376308BF2B}"/>
+              </a:ext>
+            </a:extLst>
+          </p:cNvPr>
+          <p:cNvCxnSpPr/>
+          <p:nvPr/>
+        </p:nvCxnSpPr>
+        <p:spPr>
+          <a:xfrm>
+            <a:off x="5629619" y="3646556"/>
+            <a:ext cx="0" cy="2544896"/>
+          </a:xfrm>
+          <a:prstGeom prst="line">
+            <a:avLst/>
+          </a:prstGeom>
+          <a:ln w="28575">
+            <a:solidFill>
+              <a:schemeClr val="bg1">
+                <a:lumMod val="65000"/>
+              </a:schemeClr>
+            </a:solidFill>
+            <a:prstDash val="sysDash"/>
+          </a:ln>
+        </p:spPr>
+        <p:style>
+          <a:lnRef idx="1">
+            <a:schemeClr val="accent1"/>
+          </a:lnRef>
+          <a:fillRef idx="0">
+            <a:schemeClr val="accent1"/>
+          </a:fillRef>
+          <a:effectRef idx="0">
+            <a:schemeClr val="accent1"/>
+          </a:effectRef>
+          <a:fontRef idx="minor">
+            <a:schemeClr val="tx1"/>
+          </a:fontRef>
+        </p:style>
+      </p:cxnSp>
+    </p:spTree>
+    <p:extLst>
+      <p:ext uri="{BB962C8B-B14F-4D97-AF65-F5344CB8AC3E}">
+        <p14:creationId xmlns:p14="http://schemas.microsoft.com/office/powerpoint/2010/main" val="3572781133"/>
+      </p:ext>
+    </p:extLst>
+  </p:cSld>
+  <p:clrMapOvr>
+    <a:masterClrMapping/>
+  </p:clrMapOvr>
+  <mc:AlternateContent xmlns:mc="http://schemas.openxmlformats.org/markup-compatibility/2006" xmlns:p159="http://schemas.microsoft.com/office/powerpoint/2015/09/main">
+    <mc:Choice Requires="p159">
+      <p:transition xmlns:p14="http://schemas.microsoft.com/office/powerpoint/2010/main" spd="slow" p14:dur="2000">
+        <p159:morph option="byObject"/>
+      </p:transition>
+    </mc:Choice>
+    <mc:Fallback xmlns="">
+      <p:transition spd="slow">
+        <p:fade/>
+      </p:transition>
+    </mc:Fallback>
+  </mc:AlternateContent>
+</p:sld>
+</file>
+
+<file path=ppt/slides/slide22.xml><?xml version="1.0" encoding="utf-8"?>
+<p:sld xmlns:a="http://schemas.openxmlformats.org/drawingml/2006/main" xmlns:r="http://schemas.openxmlformats.org/officeDocument/2006/relationships" xmlns:p="http://schemas.openxmlformats.org/presentationml/2006/main">
+  <p:cSld>
+    <p:spTree>
+      <p:nvGrpSpPr>
+        <p:cNvPr id="1" name=""/>
+        <p:cNvGrpSpPr/>
+        <p:nvPr/>
+      </p:nvGrpSpPr>
+      <p:grpSpPr>
+        <a:xfrm>
+          <a:off x="0" y="0"/>
+          <a:ext cx="0" cy="0"/>
+          <a:chOff x="0" y="0"/>
+          <a:chExt cx="0" cy="0"/>
+        </a:xfrm>
+      </p:grpSpPr>
+      <p:sp>
+        <p:nvSpPr>
+          <p:cNvPr id="2" name="内容占位符 1">
+            <a:extLst>
+              <a:ext uri="{FF2B5EF4-FFF2-40B4-BE49-F238E27FC236}">
+                <a16:creationId xmlns:a16="http://schemas.microsoft.com/office/drawing/2014/main" id="{9A886A44-E4B7-BAD6-B0F6-B2C995C4750A}"/>
+              </a:ext>
+            </a:extLst>
+          </p:cNvPr>
+          <p:cNvSpPr>
+            <a:spLocks noGrp="1"/>
+          </p:cNvSpPr>
+          <p:nvPr>
+            <p:ph sz="half" idx="1"/>
+          </p:nvPr>
+        </p:nvSpPr>
+        <p:spPr/>
+        <p:txBody>
+          <a:bodyPr>
+            <a:normAutofit/>
+          </a:bodyPr>
+          <a:lstStyle/>
+          <a:p>
+            <a:r>
+              <a:rPr kumimoji="1" lang="zh-CN" altLang="en-US" dirty="0"/>
+              <a:t>小结与思考</a:t>
+            </a:r>
+          </a:p>
+        </p:txBody>
+      </p:sp>
+    </p:spTree>
+    <p:extLst>
+      <p:ext uri="{BB962C8B-B14F-4D97-AF65-F5344CB8AC3E}">
+        <p14:creationId xmlns:p14="http://schemas.microsoft.com/office/powerpoint/2010/main" val="2256116713"/>
+      </p:ext>
+    </p:extLst>
+  </p:cSld>
+  <p:clrMapOvr>
+    <a:masterClrMapping/>
+  </p:clrMapOvr>
+  <mc:AlternateContent xmlns:mc="http://schemas.openxmlformats.org/markup-compatibility/2006" xmlns:p159="http://schemas.microsoft.com/office/powerpoint/2015/09/main">
+    <mc:Choice Requires="p159">
+      <p:transition xmlns:p14="http://schemas.microsoft.com/office/powerpoint/2010/main" spd="slow" p14:dur="2000">
+        <p159:morph option="byObject"/>
+      </p:transition>
+    </mc:Choice>
+    <mc:Fallback xmlns="">
+      <p:transition spd="slow">
+        <p:fade/>
+      </p:transition>
+    </mc:Fallback>
+  </mc:AlternateContent>
+</p:sld>
+</file>
+
+<file path=ppt/slides/slide23.xml><?xml version="1.0" encoding="utf-8"?>
+<p:sld xmlns:a="http://schemas.openxmlformats.org/drawingml/2006/main" xmlns:r="http://schemas.openxmlformats.org/officeDocument/2006/relationships" xmlns:p="http://schemas.openxmlformats.org/presentationml/2006/main">
+  <p:cSld>
+    <p:spTree>
+      <p:nvGrpSpPr>
+        <p:cNvPr id="1" name=""/>
+        <p:cNvGrpSpPr/>
+        <p:nvPr/>
+      </p:nvGrpSpPr>
+      <p:grpSpPr>
+        <a:xfrm>
+          <a:off x="0" y="0"/>
+          <a:ext cx="0" cy="0"/>
+          <a:chOff x="0" y="0"/>
+          <a:chExt cx="0" cy="0"/>
+        </a:xfrm>
+      </p:grpSpPr>
+      <p:sp>
+        <p:nvSpPr>
           <p:cNvPr id="5" name="标题 4">
             <a:extLst>
               <a:ext uri="{FF2B5EF4-FFF2-40B4-BE49-F238E27FC236}">
@@ -26354,22 +28719,34 @@
           <a:p>
             <a:r>
               <a:rPr lang="zh-CN" altLang="en-US" dirty="0"/>
-              <a:t>那么多不同的训练和推理产品形态，对应的 </a:t>
+              <a:t>针对大模型场景，你觉得 </a:t>
             </a:r>
             <a:r>
               <a:rPr lang="en-US" altLang="zh-CN" dirty="0"/>
-              <a:t>AI</a:t>
+              <a:t>NPU</a:t>
             </a:r>
             <a:r>
               <a:rPr lang="zh-CN" altLang="en-US" dirty="0"/>
-              <a:t> 芯片到底有多少种？怎么组合？</a:t>
+              <a:t> 可以往哪个方向改进呢？</a:t>
             </a:r>
             <a:endParaRPr lang="en-US" altLang="zh-CN" dirty="0"/>
           </a:p>
           <a:p>
             <a:r>
+              <a:rPr lang="en-US" altLang="zh-CN" dirty="0"/>
+              <a:t>Cube</a:t>
+            </a:r>
+            <a:r>
               <a:rPr lang="zh-CN" altLang="en-US" dirty="0"/>
-              <a:t>你还想了解昇腾哪些内容呢？</a:t>
+              <a:t> </a:t>
+            </a:r>
+            <a:r>
+              <a:rPr lang="en-US" altLang="zh-CN" dirty="0"/>
+              <a:t>Core</a:t>
+            </a:r>
+            <a:r>
+              <a:rPr lang="zh-CN" altLang="en-US" dirty="0"/>
+              <a:t> 计算的时候要注意数据排布、矩阵分块、数据尾数补零对齐。</a:t>
             </a:r>
           </a:p>
         </p:txBody>
@@ -26399,7 +28776,7 @@
 </p:sld>
 </file>
 
-<file path=ppt/slides/slide21.xml><?xml version="1.0" encoding="utf-8"?>
+<file path=ppt/slides/slide24.xml><?xml version="1.0" encoding="utf-8"?>
 <p:sld xmlns:a="http://schemas.openxmlformats.org/drawingml/2006/main" xmlns:r="http://schemas.openxmlformats.org/officeDocument/2006/relationships" xmlns:p="http://schemas.openxmlformats.org/presentationml/2006/main">
   <p:cSld>
     <p:spTree>
@@ -26489,7 +28866,7 @@
           <a:p>
             <a:r>
               <a:rPr kumimoji="1" lang="zh-CN" altLang="en-US" dirty="0"/>
-              <a:t>数据通路</a:t>
+              <a:t>计算数据通路</a:t>
             </a:r>
           </a:p>
         </p:txBody>
@@ -27274,51 +29651,10 @@
       </p:grpSpPr>
       <p:sp>
         <p:nvSpPr>
-          <p:cNvPr id="4" name="标题 3">
+          <p:cNvPr id="2" name="内容占位符 1">
             <a:extLst>
               <a:ext uri="{FF2B5EF4-FFF2-40B4-BE49-F238E27FC236}">
-                <a16:creationId xmlns:a16="http://schemas.microsoft.com/office/drawing/2014/main" id="{3FD4C806-CB02-5AC4-4CBB-B4AF326DF034}"/>
-              </a:ext>
-            </a:extLst>
-          </p:cNvPr>
-          <p:cNvSpPr>
-            <a:spLocks noGrp="1"/>
-          </p:cNvSpPr>
-          <p:nvPr>
-            <p:ph type="title"/>
-          </p:nvPr>
-        </p:nvSpPr>
-        <p:spPr>
-          <a:xfrm>
-            <a:off x="623635" y="558414"/>
-            <a:ext cx="10963473" cy="589190"/>
-          </a:xfrm>
-        </p:spPr>
-        <p:txBody>
-          <a:bodyPr/>
-          <a:lstStyle/>
-          <a:p>
-            <a:r>
-              <a:rPr lang="en-US" altLang="zh-CN" dirty="0"/>
-              <a:t>AI Core</a:t>
-            </a:r>
-            <a:r>
-              <a:rPr lang="zh-CN" altLang="en-US" dirty="0"/>
-              <a:t>：计算单元 </a:t>
-            </a:r>
-            <a:r>
-              <a:rPr lang="en-US" altLang="zh-CN" dirty="0"/>
-              <a:t>Vector Unit</a:t>
-            </a:r>
-          </a:p>
-        </p:txBody>
-      </p:sp>
-      <p:sp>
-        <p:nvSpPr>
-          <p:cNvPr id="3" name="内容占位符 2">
-            <a:extLst>
-              <a:ext uri="{FF2B5EF4-FFF2-40B4-BE49-F238E27FC236}">
-                <a16:creationId xmlns:a16="http://schemas.microsoft.com/office/drawing/2014/main" id="{0D8A0164-EE35-BCC3-B7F8-8F02AAF64E8F}"/>
+                <a16:creationId xmlns:a16="http://schemas.microsoft.com/office/drawing/2014/main" id="{9A886A44-E4B7-BAD6-B0F6-B2C995C4750A}"/>
               </a:ext>
             </a:extLst>
           </p:cNvPr>
@@ -27329,252 +29665,30 @@
             <p:ph sz="half" idx="1"/>
           </p:nvPr>
         </p:nvSpPr>
-        <p:spPr>
-          <a:xfrm>
-            <a:off x="623888" y="1280478"/>
-            <a:ext cx="10963275" cy="4994275"/>
-          </a:xfrm>
-        </p:spPr>
+        <p:spPr/>
         <p:txBody>
-          <a:bodyPr anchor="t"/>
+          <a:bodyPr>
+            <a:normAutofit/>
+          </a:bodyPr>
           <a:lstStyle/>
           <a:p>
-            <a:pPr>
-              <a:lnSpc>
-                <a:spcPct val="150000"/>
-              </a:lnSpc>
-            </a:pPr>
-            <a:r>
-              <a:rPr lang="en-US" altLang="zh-CN" dirty="0"/>
-              <a:t>Vector Unit</a:t>
-            </a:r>
-            <a:r>
-              <a:rPr lang="zh-CN" altLang="en-US" dirty="0"/>
-              <a:t> </a:t>
-            </a:r>
-            <a:r>
-              <a:rPr lang="zh-CN" altLang="zh-CN" dirty="0"/>
-              <a:t>主要负责完成和向量相关运算，能够实现向量</a:t>
-            </a:r>
-            <a:r>
-              <a:rPr lang="en-US" altLang="zh-CN" dirty="0"/>
-              <a:t>/</a:t>
-            </a:r>
-            <a:r>
-              <a:rPr lang="zh-CN" altLang="zh-CN" dirty="0"/>
-              <a:t>标量</a:t>
-            </a:r>
-            <a:r>
-              <a:rPr lang="en-US" altLang="zh-CN" dirty="0"/>
-              <a:t>/</a:t>
-            </a:r>
-            <a:r>
-              <a:rPr lang="zh-CN" altLang="zh-CN" dirty="0"/>
-              <a:t>双向量间计算，功能覆盖各种基本和多种定制计算类型，包括</a:t>
-            </a:r>
-            <a:r>
-              <a:rPr lang="en-US" altLang="zh-CN" dirty="0"/>
-              <a:t>FP32</a:t>
-            </a:r>
-            <a:r>
-              <a:rPr lang="zh-CN" altLang="zh-CN" dirty="0"/>
-              <a:t>、</a:t>
-            </a:r>
-            <a:r>
-              <a:rPr lang="en-US" altLang="zh-CN" dirty="0"/>
-              <a:t>FP16</a:t>
-            </a:r>
-            <a:r>
-              <a:rPr lang="zh-CN" altLang="zh-CN" dirty="0"/>
-              <a:t>、</a:t>
-            </a:r>
-            <a:r>
-              <a:rPr lang="en-US" altLang="zh-CN" dirty="0"/>
-              <a:t>INT32</a:t>
-            </a:r>
-            <a:r>
-              <a:rPr lang="zh-CN" altLang="zh-CN" dirty="0"/>
-              <a:t>和</a:t>
-            </a:r>
-            <a:r>
-              <a:rPr lang="en-US" altLang="zh-CN" dirty="0"/>
-              <a:t>INT8</a:t>
-            </a:r>
-            <a:r>
-              <a:rPr lang="zh-CN" altLang="zh-CN" dirty="0"/>
-              <a:t>等数据类型计算。</a:t>
-            </a:r>
-            <a:endParaRPr lang="en-US" altLang="zh-CN" dirty="0"/>
+            <a:r>
+              <a:rPr kumimoji="1" lang="en-US" altLang="zh-CN" dirty="0"/>
+              <a:t>AICore</a:t>
+            </a:r>
           </a:p>
           <a:p>
-            <a:pPr lvl="1"/>
-            <a:r>
-              <a:rPr lang="en-US" altLang="zh-CN" dirty="0"/>
-              <a:t>e.g.</a:t>
-            </a:r>
-            <a:r>
-              <a:rPr lang="zh-CN" altLang="en-US" dirty="0"/>
-              <a:t> </a:t>
-            </a:r>
-            <a:r>
-              <a:rPr lang="zh-CN" altLang="zh-CN" dirty="0"/>
-              <a:t>可快速完成两个</a:t>
-            </a:r>
-            <a:r>
-              <a:rPr lang="zh-CN" altLang="en-US" dirty="0"/>
-              <a:t> </a:t>
-            </a:r>
-            <a:r>
-              <a:rPr lang="en-US" altLang="zh-CN" dirty="0"/>
-              <a:t>FP16</a:t>
-            </a:r>
-            <a:r>
-              <a:rPr lang="zh-CN" altLang="en-US" dirty="0"/>
-              <a:t> </a:t>
-            </a:r>
-            <a:r>
-              <a:rPr lang="zh-CN" altLang="zh-CN" dirty="0"/>
-              <a:t>向量相加或者相乘。源操作数和目的操作数</a:t>
-            </a:r>
-            <a:r>
-              <a:rPr lang="zh-CN" altLang="en-US" dirty="0"/>
-              <a:t>，</a:t>
-            </a:r>
-            <a:r>
-              <a:rPr lang="zh-CN" altLang="zh-CN" dirty="0"/>
-              <a:t>通常保存在</a:t>
-            </a:r>
-            <a:r>
-              <a:rPr lang="en-US" altLang="zh-CN" dirty="0"/>
-              <a:t>output</a:t>
-            </a:r>
-            <a:r>
-              <a:rPr lang="zh-CN" altLang="en-US" dirty="0"/>
-              <a:t> </a:t>
-            </a:r>
-            <a:r>
-              <a:rPr lang="en-US" altLang="zh-CN" dirty="0"/>
-              <a:t>buffer</a:t>
-            </a:r>
-            <a:r>
-              <a:rPr lang="zh-CN" altLang="zh-CN" dirty="0"/>
-              <a:t>。</a:t>
-            </a:r>
-            <a:endParaRPr lang="en-US" altLang="zh-CN" dirty="0"/>
-          </a:p>
-          <a:p>
-            <a:pPr lvl="1"/>
-            <a:r>
-              <a:rPr lang="en-US" altLang="zh-CN" dirty="0"/>
-              <a:t>imp.</a:t>
-            </a:r>
-            <a:r>
-              <a:rPr lang="zh-CN" altLang="en-US" dirty="0"/>
-              <a:t> </a:t>
-            </a:r>
-            <a:r>
-              <a:rPr lang="zh-CN" altLang="zh-CN" dirty="0"/>
-              <a:t>对</a:t>
-            </a:r>
-            <a:r>
-              <a:rPr lang="en-US" altLang="zh-CN" dirty="0"/>
-              <a:t>Vector Unit</a:t>
-            </a:r>
-            <a:r>
-              <a:rPr lang="zh-CN" altLang="en-US" dirty="0"/>
-              <a:t> </a:t>
-            </a:r>
-            <a:r>
-              <a:rPr lang="zh-CN" altLang="zh-CN" dirty="0"/>
-              <a:t>输入数据可以不连续，这取决于输入数据寻址模式。</a:t>
+            <a:r>
+              <a:rPr kumimoji="1" lang="zh-CN" altLang="en-US" dirty="0"/>
+              <a:t>计算本质</a:t>
             </a:r>
           </a:p>
         </p:txBody>
       </p:sp>
-      <p:pic>
-        <p:nvPicPr>
-          <p:cNvPr id="6" name="图片 5">
-            <a:extLst>
-              <a:ext uri="{FF2B5EF4-FFF2-40B4-BE49-F238E27FC236}">
-                <a16:creationId xmlns:a16="http://schemas.microsoft.com/office/drawing/2014/main" id="{221103CA-5077-016C-D97E-F3298106BF22}"/>
-              </a:ext>
-            </a:extLst>
-          </p:cNvPr>
-          <p:cNvPicPr>
-            <a:picLocks noChangeAspect="1"/>
-          </p:cNvPicPr>
-          <p:nvPr/>
-        </p:nvPicPr>
-        <p:blipFill>
-          <a:blip r:embed="rId2">
-            <a:extLst>
-              <a:ext uri="{28A0092B-C50C-407E-A947-70E740481C1C}">
-                <a14:useLocalDpi xmlns:a14="http://schemas.microsoft.com/office/drawing/2010/main" val="0"/>
-              </a:ext>
-            </a:extLst>
-          </a:blip>
-          <a:stretch>
-            <a:fillRect/>
-          </a:stretch>
-        </p:blipFill>
-        <p:spPr>
-          <a:xfrm>
-            <a:off x="1217460" y="3646556"/>
-            <a:ext cx="9409302" cy="2653030"/>
-          </a:xfrm>
-          <a:prstGeom prst="rect">
-            <a:avLst/>
-          </a:prstGeom>
-        </p:spPr>
-      </p:pic>
-      <p:cxnSp>
-        <p:nvCxnSpPr>
-          <p:cNvPr id="8" name="直线连接符 7">
-            <a:extLst>
-              <a:ext uri="{FF2B5EF4-FFF2-40B4-BE49-F238E27FC236}">
-                <a16:creationId xmlns:a16="http://schemas.microsoft.com/office/drawing/2014/main" id="{78CCA4C2-8508-0846-CA32-62376308BF2B}"/>
-              </a:ext>
-            </a:extLst>
-          </p:cNvPr>
-          <p:cNvCxnSpPr/>
-          <p:nvPr/>
-        </p:nvCxnSpPr>
-        <p:spPr>
-          <a:xfrm>
-            <a:off x="5629619" y="3646556"/>
-            <a:ext cx="0" cy="2544896"/>
-          </a:xfrm>
-          <a:prstGeom prst="line">
-            <a:avLst/>
-          </a:prstGeom>
-          <a:ln w="28575">
-            <a:solidFill>
-              <a:schemeClr val="bg1">
-                <a:lumMod val="65000"/>
-              </a:schemeClr>
-            </a:solidFill>
-            <a:prstDash val="sysDash"/>
-          </a:ln>
-        </p:spPr>
-        <p:style>
-          <a:lnRef idx="1">
-            <a:schemeClr val="accent1"/>
-          </a:lnRef>
-          <a:fillRef idx="0">
-            <a:schemeClr val="accent1"/>
-          </a:fillRef>
-          <a:effectRef idx="0">
-            <a:schemeClr val="accent1"/>
-          </a:effectRef>
-          <a:fontRef idx="minor">
-            <a:schemeClr val="tx1"/>
-          </a:fontRef>
-        </p:style>
-      </p:cxnSp>
     </p:spTree>
     <p:extLst>
       <p:ext uri="{BB962C8B-B14F-4D97-AF65-F5344CB8AC3E}">
-        <p14:creationId xmlns:p14="http://schemas.microsoft.com/office/powerpoint/2010/main" val="3572781133"/>
+        <p14:creationId xmlns:p14="http://schemas.microsoft.com/office/powerpoint/2010/main" val="3474166444"/>
       </p:ext>
     </p:extLst>
   </p:cSld>

</xml_diff>